<commit_message>
Added slide with report example.
</commit_message>
<xml_diff>
--- a/presentation/jastt.pptx
+++ b/presentation/jastt.pptx
@@ -5,10 +5,10 @@
     <p:sldMasterId id="2147483648" r:id="rId1"/>
   </p:sldMasterIdLst>
   <p:notesMasterIdLst>
-    <p:notesMasterId r:id="rId17"/>
+    <p:notesMasterId r:id="rId18"/>
   </p:notesMasterIdLst>
   <p:handoutMasterIdLst>
-    <p:handoutMasterId r:id="rId18"/>
+    <p:handoutMasterId r:id="rId19"/>
   </p:handoutMasterIdLst>
   <p:sldIdLst>
     <p:sldId id="256" r:id="rId2"/>
@@ -23,9 +23,10 @@
     <p:sldId id="267" r:id="rId11"/>
     <p:sldId id="268" r:id="rId12"/>
     <p:sldId id="269" r:id="rId13"/>
-    <p:sldId id="270" r:id="rId14"/>
-    <p:sldId id="264" r:id="rId15"/>
-    <p:sldId id="257" r:id="rId16"/>
+    <p:sldId id="271" r:id="rId14"/>
+    <p:sldId id="270" r:id="rId15"/>
+    <p:sldId id="264" r:id="rId16"/>
+    <p:sldId id="257" r:id="rId17"/>
   </p:sldIdLst>
   <p:sldSz cx="9144000" cy="6858000" type="screen4x3"/>
   <p:notesSz cx="6858000" cy="9144000"/>
@@ -3890,7 +3891,7 @@
       </p:grpSpPr>
       <p:pic>
         <p:nvPicPr>
-          <p:cNvPr id="2050" name="Picture 2" descr="C:\repo\project-jastt\presentation\source\login_page.png"/>
+          <p:cNvPr id="2" name="Picture 2" descr="C:\repo\project-jastt\presentation\source\login_page.png"/>
           <p:cNvPicPr>
             <a:picLocks noChangeAspect="1" noChangeArrowheads="1"/>
           </p:cNvPicPr>
@@ -3898,15 +3899,15 @@
         </p:nvPicPr>
         <p:blipFill>
           <a:blip r:embed="rId2"/>
-          <a:srcRect r="34590" b="34650"/>
+          <a:srcRect r="27672"/>
           <a:stretch>
             <a:fillRect/>
           </a:stretch>
         </p:blipFill>
         <p:spPr bwMode="auto">
           <a:xfrm>
-            <a:off x="285720" y="1571612"/>
-            <a:ext cx="8606705" cy="3777116"/>
+            <a:off x="285720" y="1000108"/>
+            <a:ext cx="8298718" cy="5040000"/>
           </a:xfrm>
           <a:prstGeom prst="rect">
             <a:avLst/>
@@ -4064,44 +4065,6 @@
       </p:grpSpPr>
       <p:sp>
         <p:nvSpPr>
-          <p:cNvPr id="2" name="Заголовок 1"/>
-          <p:cNvSpPr>
-            <a:spLocks noGrp="1"/>
-          </p:cNvSpPr>
-          <p:nvPr>
-            <p:ph type="title"/>
-          </p:nvPr>
-        </p:nvSpPr>
-        <p:spPr/>
-        <p:txBody>
-          <a:bodyPr/>
-          <a:lstStyle/>
-          <a:p>
-            <a:endParaRPr lang="ru-RU"/>
-          </a:p>
-        </p:txBody>
-      </p:sp>
-      <p:sp>
-        <p:nvSpPr>
-          <p:cNvPr id="4" name="Нижний колонтитул 3"/>
-          <p:cNvSpPr>
-            <a:spLocks noGrp="1"/>
-          </p:cNvSpPr>
-          <p:nvPr>
-            <p:ph type="ftr" sz="quarter" idx="11"/>
-          </p:nvPr>
-        </p:nvSpPr>
-        <p:spPr/>
-        <p:txBody>
-          <a:bodyPr/>
-          <a:lstStyle/>
-          <a:p>
-            <a:endParaRPr lang="ru-RU"/>
-          </a:p>
-        </p:txBody>
-      </p:sp>
-      <p:sp>
-        <p:nvSpPr>
           <p:cNvPr id="5" name="Номер слайда 4"/>
           <p:cNvSpPr>
             <a:spLocks noGrp="1"/>
@@ -4126,13 +4089,11 @@
       </p:sp>
       <p:pic>
         <p:nvPicPr>
-          <p:cNvPr id="5122" name="Picture 2" descr="C:\repo\project-jastt\presentation\source\admin_page.png"/>
+          <p:cNvPr id="1026" name="Picture 2" descr="C:\repo\project-jastt\presentation\source\report(pdf).png"/>
           <p:cNvPicPr>
-            <a:picLocks noGrp="1" noChangeAspect="1" noChangeArrowheads="1"/>
+            <a:picLocks noChangeAspect="1" noChangeArrowheads="1"/>
           </p:cNvPicPr>
-          <p:nvPr>
-            <p:ph idx="1"/>
-          </p:nvPr>
+          <p:nvPr/>
         </p:nvPicPr>
         <p:blipFill>
           <a:blip r:embed="rId2"/>
@@ -4143,8 +4104,8 @@
         </p:blipFill>
         <p:spPr bwMode="auto">
           <a:xfrm>
-            <a:off x="285720" y="2071678"/>
-            <a:ext cx="8605801" cy="3780000"/>
+            <a:off x="214282" y="1571612"/>
+            <a:ext cx="8713340" cy="4320000"/>
           </a:xfrm>
           <a:prstGeom prst="rect">
             <a:avLst/>
@@ -4179,6 +4140,121 @@
       </p:grpSpPr>
       <p:sp>
         <p:nvSpPr>
+          <p:cNvPr id="2" name="Заголовок 1"/>
+          <p:cNvSpPr>
+            <a:spLocks noGrp="1"/>
+          </p:cNvSpPr>
+          <p:nvPr>
+            <p:ph type="title"/>
+          </p:nvPr>
+        </p:nvSpPr>
+        <p:spPr/>
+        <p:txBody>
+          <a:bodyPr/>
+          <a:lstStyle/>
+          <a:p>
+            <a:endParaRPr lang="ru-RU"/>
+          </a:p>
+        </p:txBody>
+      </p:sp>
+      <p:sp>
+        <p:nvSpPr>
+          <p:cNvPr id="4" name="Нижний колонтитул 3"/>
+          <p:cNvSpPr>
+            <a:spLocks noGrp="1"/>
+          </p:cNvSpPr>
+          <p:nvPr>
+            <p:ph type="ftr" sz="quarter" idx="11"/>
+          </p:nvPr>
+        </p:nvSpPr>
+        <p:spPr/>
+        <p:txBody>
+          <a:bodyPr/>
+          <a:lstStyle/>
+          <a:p>
+            <a:endParaRPr lang="ru-RU"/>
+          </a:p>
+        </p:txBody>
+      </p:sp>
+      <p:sp>
+        <p:nvSpPr>
+          <p:cNvPr id="5" name="Номер слайда 4"/>
+          <p:cNvSpPr>
+            <a:spLocks noGrp="1"/>
+          </p:cNvSpPr>
+          <p:nvPr>
+            <p:ph type="sldNum" sz="quarter" idx="12"/>
+          </p:nvPr>
+        </p:nvSpPr>
+        <p:spPr/>
+        <p:txBody>
+          <a:bodyPr/>
+          <a:lstStyle/>
+          <a:p>
+            <a:fld id="{11D68980-9ECF-4181-A23B-CB36B8F9F50A}" type="slidenum">
+              <a:rPr lang="ru-RU" smtClean="0"/>
+              <a:pPr/>
+              <a:t>14</a:t>
+            </a:fld>
+            <a:endParaRPr lang="ru-RU"/>
+          </a:p>
+        </p:txBody>
+      </p:sp>
+      <p:pic>
+        <p:nvPicPr>
+          <p:cNvPr id="5122" name="Picture 2" descr="C:\repo\project-jastt\presentation\source\admin_page.png"/>
+          <p:cNvPicPr>
+            <a:picLocks noGrp="1" noChangeAspect="1" noChangeArrowheads="1"/>
+          </p:cNvPicPr>
+          <p:nvPr>
+            <p:ph idx="1"/>
+          </p:nvPr>
+        </p:nvPicPr>
+        <p:blipFill>
+          <a:blip r:embed="rId2"/>
+          <a:srcRect/>
+          <a:stretch>
+            <a:fillRect/>
+          </a:stretch>
+        </p:blipFill>
+        <p:spPr bwMode="auto">
+          <a:xfrm>
+            <a:off x="285720" y="2071678"/>
+            <a:ext cx="8605801" cy="3780000"/>
+          </a:xfrm>
+          <a:prstGeom prst="rect">
+            <a:avLst/>
+          </a:prstGeom>
+          <a:noFill/>
+        </p:spPr>
+      </p:pic>
+    </p:spTree>
+  </p:cSld>
+  <p:clrMapOvr>
+    <a:masterClrMapping/>
+  </p:clrMapOvr>
+</p:sld>
+</file>
+
+<file path=ppt/slides/slide15.xml><?xml version="1.0" encoding="utf-8"?>
+<p:sld xmlns:a="http://schemas.openxmlformats.org/drawingml/2006/main" xmlns:r="http://schemas.openxmlformats.org/officeDocument/2006/relationships" xmlns:p="http://schemas.openxmlformats.org/presentationml/2006/main">
+  <p:cSld>
+    <p:spTree>
+      <p:nvGrpSpPr>
+        <p:cNvPr id="1" name=""/>
+        <p:cNvGrpSpPr/>
+        <p:nvPr/>
+      </p:nvGrpSpPr>
+      <p:grpSpPr>
+        <a:xfrm>
+          <a:off x="0" y="0"/>
+          <a:ext cx="0" cy="0"/>
+          <a:chOff x="0" y="0"/>
+          <a:chExt cx="0" cy="0"/>
+        </a:xfrm>
+      </p:grpSpPr>
+      <p:sp>
+        <p:nvSpPr>
           <p:cNvPr id="4" name="Заголовок 3"/>
           <p:cNvSpPr>
             <a:spLocks noGrp="1"/>
@@ -4291,7 +4367,7 @@
           <a:blip r:embed="rId2" cstate="print">
             <a:extLst>
               <a:ext uri="{28A0092B-C50C-407E-A947-70E740481C1C}">
-                <a14:useLocalDpi xmlns="" xmlns:a14="http://schemas.microsoft.com/office/drawing/2010/main" val="0"/>
+                <a14:useLocalDpi xmlns:a14="http://schemas.microsoft.com/office/drawing/2010/main" xmlns="" val="0"/>
               </a:ext>
             </a:extLst>
           </a:blip>
@@ -4315,7 +4391,7 @@
           <a:effectLst/>
           <a:extLst>
             <a:ext uri="{909E8E84-426E-40DD-AFC4-6F175D3DCCD1}">
-              <a14:hiddenFill xmlns="" xmlns:a14="http://schemas.microsoft.com/office/drawing/2010/main">
+              <a14:hiddenFill xmlns:a14="http://schemas.microsoft.com/office/drawing/2010/main" xmlns="">
                 <a:blipFill dpi="0" rotWithShape="0">
                   <a:blip/>
                   <a:srcRect/>
@@ -4326,7 +4402,7 @@
               </a14:hiddenFill>
             </a:ext>
             <a:ext uri="{91240B29-F687-4F45-9708-019B960494DF}">
-              <a14:hiddenLine xmlns="" xmlns:a14="http://schemas.microsoft.com/office/drawing/2010/main" w="9525">
+              <a14:hiddenLine xmlns:a14="http://schemas.microsoft.com/office/drawing/2010/main" xmlns="" w="9525">
                 <a:solidFill>
                   <a:srgbClr val="808080"/>
                 </a:solidFill>
@@ -4336,7 +4412,7 @@
               </a14:hiddenLine>
             </a:ext>
             <a:ext uri="{AF507438-7753-43E0-B8FC-AC1667EBCBE1}">
-              <a14:hiddenEffects xmlns="" xmlns:a14="http://schemas.microsoft.com/office/drawing/2010/main">
+              <a14:hiddenEffects xmlns:a14="http://schemas.microsoft.com/office/drawing/2010/main" xmlns="">
                 <a:effectLst>
                   <a:outerShdw dist="35921" dir="2700000" algn="ctr" rotWithShape="0">
                     <a:srgbClr val="808080"/>
@@ -4359,7 +4435,7 @@
           <a:blip r:embed="rId3" cstate="print">
             <a:extLst>
               <a:ext uri="{28A0092B-C50C-407E-A947-70E740481C1C}">
-                <a14:useLocalDpi xmlns="" xmlns:a14="http://schemas.microsoft.com/office/drawing/2010/main" val="0"/>
+                <a14:useLocalDpi xmlns:a14="http://schemas.microsoft.com/office/drawing/2010/main" xmlns="" val="0"/>
               </a:ext>
             </a:extLst>
           </a:blip>
@@ -4383,7 +4459,7 @@
           <a:effectLst/>
           <a:extLst>
             <a:ext uri="{909E8E84-426E-40DD-AFC4-6F175D3DCCD1}">
-              <a14:hiddenFill xmlns="" xmlns:a14="http://schemas.microsoft.com/office/drawing/2010/main">
+              <a14:hiddenFill xmlns:a14="http://schemas.microsoft.com/office/drawing/2010/main" xmlns="">
                 <a:blipFill dpi="0" rotWithShape="0">
                   <a:blip/>
                   <a:srcRect/>
@@ -4394,7 +4470,7 @@
               </a14:hiddenFill>
             </a:ext>
             <a:ext uri="{91240B29-F687-4F45-9708-019B960494DF}">
-              <a14:hiddenLine xmlns="" xmlns:a14="http://schemas.microsoft.com/office/drawing/2010/main" w="9525">
+              <a14:hiddenLine xmlns:a14="http://schemas.microsoft.com/office/drawing/2010/main" xmlns="" w="9525">
                 <a:solidFill>
                   <a:srgbClr val="808080"/>
                 </a:solidFill>
@@ -4404,7 +4480,7 @@
               </a14:hiddenLine>
             </a:ext>
             <a:ext uri="{AF507438-7753-43E0-B8FC-AC1667EBCBE1}">
-              <a14:hiddenEffects xmlns="" xmlns:a14="http://schemas.microsoft.com/office/drawing/2010/main">
+              <a14:hiddenEffects xmlns:a14="http://schemas.microsoft.com/office/drawing/2010/main" xmlns="">
                 <a:effectLst>
                   <a:outerShdw dist="35921" dir="2700000" algn="ctr" rotWithShape="0">
                     <a:srgbClr val="808080"/>
@@ -4427,7 +4503,7 @@
           <a:blip r:embed="rId4" cstate="print">
             <a:extLst>
               <a:ext uri="{28A0092B-C50C-407E-A947-70E740481C1C}">
-                <a14:useLocalDpi xmlns="" xmlns:a14="http://schemas.microsoft.com/office/drawing/2010/main" val="0"/>
+                <a14:useLocalDpi xmlns:a14="http://schemas.microsoft.com/office/drawing/2010/main" xmlns="" val="0"/>
               </a:ext>
             </a:extLst>
           </a:blip>
@@ -4451,7 +4527,7 @@
           <a:effectLst/>
           <a:extLst>
             <a:ext uri="{909E8E84-426E-40DD-AFC4-6F175D3DCCD1}">
-              <a14:hiddenFill xmlns="" xmlns:a14="http://schemas.microsoft.com/office/drawing/2010/main">
+              <a14:hiddenFill xmlns:a14="http://schemas.microsoft.com/office/drawing/2010/main" xmlns="">
                 <a:blipFill dpi="0" rotWithShape="0">
                   <a:blip/>
                   <a:srcRect/>
@@ -4462,7 +4538,7 @@
               </a14:hiddenFill>
             </a:ext>
             <a:ext uri="{91240B29-F687-4F45-9708-019B960494DF}">
-              <a14:hiddenLine xmlns="" xmlns:a14="http://schemas.microsoft.com/office/drawing/2010/main" w="9525">
+              <a14:hiddenLine xmlns:a14="http://schemas.microsoft.com/office/drawing/2010/main" xmlns="" w="9525">
                 <a:solidFill>
                   <a:srgbClr val="808080"/>
                 </a:solidFill>
@@ -4472,7 +4548,7 @@
               </a14:hiddenLine>
             </a:ext>
             <a:ext uri="{AF507438-7753-43E0-B8FC-AC1667EBCBE1}">
-              <a14:hiddenEffects xmlns="" xmlns:a14="http://schemas.microsoft.com/office/drawing/2010/main">
+              <a14:hiddenEffects xmlns:a14="http://schemas.microsoft.com/office/drawing/2010/main" xmlns="">
                 <a:effectLst>
                   <a:outerShdw dist="35921" dir="2700000" algn="ctr" rotWithShape="0">
                     <a:srgbClr val="808080"/>
@@ -4495,7 +4571,7 @@
           <a:blip r:embed="rId5" cstate="print">
             <a:extLst>
               <a:ext uri="{28A0092B-C50C-407E-A947-70E740481C1C}">
-                <a14:useLocalDpi xmlns="" xmlns:a14="http://schemas.microsoft.com/office/drawing/2010/main" val="0"/>
+                <a14:useLocalDpi xmlns:a14="http://schemas.microsoft.com/office/drawing/2010/main" xmlns="" val="0"/>
               </a:ext>
             </a:extLst>
           </a:blip>
@@ -4518,14 +4594,14 @@
           </a:ln>
           <a:extLst>
             <a:ext uri="{909E8E84-426E-40DD-AFC4-6F175D3DCCD1}">
-              <a14:hiddenFill xmlns="" xmlns:a14="http://schemas.microsoft.com/office/drawing/2010/main">
+              <a14:hiddenFill xmlns:a14="http://schemas.microsoft.com/office/drawing/2010/main" xmlns="">
                 <a:solidFill>
                   <a:schemeClr val="accent1"/>
                 </a:solidFill>
               </a14:hiddenFill>
             </a:ext>
             <a:ext uri="{91240B29-F687-4F45-9708-019B960494DF}">
-              <a14:hiddenLine xmlns="" xmlns:a14="http://schemas.microsoft.com/office/drawing/2010/main" w="9525">
+              <a14:hiddenLine xmlns:a14="http://schemas.microsoft.com/office/drawing/2010/main" xmlns="" w="9525">
                 <a:solidFill>
                   <a:schemeClr val="tx1"/>
                 </a:solidFill>
@@ -4549,7 +4625,7 @@
           <a:blip r:embed="rId6" cstate="print">
             <a:extLst>
               <a:ext uri="{28A0092B-C50C-407E-A947-70E740481C1C}">
-                <a14:useLocalDpi xmlns="" xmlns:a14="http://schemas.microsoft.com/office/drawing/2010/main" val="0"/>
+                <a14:useLocalDpi xmlns:a14="http://schemas.microsoft.com/office/drawing/2010/main" xmlns="" val="0"/>
               </a:ext>
             </a:extLst>
           </a:blip>
@@ -4573,7 +4649,7 @@
           <a:effectLst/>
           <a:extLst>
             <a:ext uri="{909E8E84-426E-40DD-AFC4-6F175D3DCCD1}">
-              <a14:hiddenFill xmlns="" xmlns:a14="http://schemas.microsoft.com/office/drawing/2010/main">
+              <a14:hiddenFill xmlns:a14="http://schemas.microsoft.com/office/drawing/2010/main" xmlns="">
                 <a:blipFill dpi="0" rotWithShape="0">
                   <a:blip/>
                   <a:srcRect/>
@@ -4584,7 +4660,7 @@
               </a14:hiddenFill>
             </a:ext>
             <a:ext uri="{91240B29-F687-4F45-9708-019B960494DF}">
-              <a14:hiddenLine xmlns="" xmlns:a14="http://schemas.microsoft.com/office/drawing/2010/main" w="9525">
+              <a14:hiddenLine xmlns:a14="http://schemas.microsoft.com/office/drawing/2010/main" xmlns="" w="9525">
                 <a:solidFill>
                   <a:srgbClr val="808080"/>
                 </a:solidFill>
@@ -4594,7 +4670,7 @@
               </a14:hiddenLine>
             </a:ext>
             <a:ext uri="{AF507438-7753-43E0-B8FC-AC1667EBCBE1}">
-              <a14:hiddenEffects xmlns="" xmlns:a14="http://schemas.microsoft.com/office/drawing/2010/main">
+              <a14:hiddenEffects xmlns:a14="http://schemas.microsoft.com/office/drawing/2010/main" xmlns="">
                 <a:effectLst>
                   <a:outerShdw dist="35921" dir="2700000" algn="ctr" rotWithShape="0">
                     <a:srgbClr val="808080"/>
@@ -4617,7 +4693,7 @@
           <a:blip r:embed="rId7" cstate="print">
             <a:extLst>
               <a:ext uri="{28A0092B-C50C-407E-A947-70E740481C1C}">
-                <a14:useLocalDpi xmlns="" xmlns:a14="http://schemas.microsoft.com/office/drawing/2010/main" val="0"/>
+                <a14:useLocalDpi xmlns:a14="http://schemas.microsoft.com/office/drawing/2010/main" xmlns="" val="0"/>
               </a:ext>
             </a:extLst>
           </a:blip>
@@ -4641,7 +4717,7 @@
           <a:effectLst/>
           <a:extLst>
             <a:ext uri="{909E8E84-426E-40DD-AFC4-6F175D3DCCD1}">
-              <a14:hiddenFill xmlns="" xmlns:a14="http://schemas.microsoft.com/office/drawing/2010/main">
+              <a14:hiddenFill xmlns:a14="http://schemas.microsoft.com/office/drawing/2010/main" xmlns="">
                 <a:blipFill dpi="0" rotWithShape="0">
                   <a:blip/>
                   <a:srcRect/>
@@ -4652,7 +4728,7 @@
               </a14:hiddenFill>
             </a:ext>
             <a:ext uri="{91240B29-F687-4F45-9708-019B960494DF}">
-              <a14:hiddenLine xmlns="" xmlns:a14="http://schemas.microsoft.com/office/drawing/2010/main" w="9525">
+              <a14:hiddenLine xmlns:a14="http://schemas.microsoft.com/office/drawing/2010/main" xmlns="" w="9525">
                 <a:solidFill>
                   <a:srgbClr val="808080"/>
                 </a:solidFill>
@@ -4662,7 +4738,7 @@
               </a14:hiddenLine>
             </a:ext>
             <a:ext uri="{AF507438-7753-43E0-B8FC-AC1667EBCBE1}">
-              <a14:hiddenEffects xmlns="" xmlns:a14="http://schemas.microsoft.com/office/drawing/2010/main">
+              <a14:hiddenEffects xmlns:a14="http://schemas.microsoft.com/office/drawing/2010/main" xmlns="">
                 <a:effectLst>
                   <a:outerShdw dist="35921" dir="2700000" algn="ctr" rotWithShape="0">
                     <a:srgbClr val="808080"/>
@@ -4884,7 +4960,7 @@
 </p:sld>
 </file>
 
-<file path=ppt/slides/slide15.xml><?xml version="1.0" encoding="utf-8"?>
+<file path=ppt/slides/slide16.xml><?xml version="1.0" encoding="utf-8"?>
 <p:sld xmlns:a="http://schemas.openxmlformats.org/drawingml/2006/main" xmlns:r="http://schemas.openxmlformats.org/officeDocument/2006/relationships" xmlns:p="http://schemas.openxmlformats.org/presentationml/2006/main">
   <p:cSld>
     <p:spTree>
@@ -4919,7 +4995,7 @@
             <a:fld id="{11D68980-9ECF-4181-A23B-CB36B8F9F50A}" type="slidenum">
               <a:rPr lang="ru-RU" smtClean="0"/>
               <a:pPr/>
-              <a:t>15</a:t>
+              <a:t>16</a:t>
             </a:fld>
             <a:endParaRPr lang="ru-RU"/>
           </a:p>
@@ -5325,29 +5401,7 @@
                 </a:solidFill>
                 <a:latin typeface="Verdana" pitchFamily="34" charset="0"/>
               </a:rPr>
-              <a:t>Архитектура</a:t>
-            </a:r>
-            <a:r>
-              <a:rPr lang="ru-RU" dirty="0" smtClean="0">
-                <a:solidFill>
-                  <a:schemeClr val="tx2">
-                    <a:lumMod val="75000"/>
-                  </a:schemeClr>
-                </a:solidFill>
-                <a:latin typeface="Verdana" pitchFamily="34" charset="0"/>
-              </a:rPr>
-              <a:t> </a:t>
-            </a:r>
-            <a:r>
-              <a:rPr lang="ru-RU" dirty="0" smtClean="0">
-                <a:solidFill>
-                  <a:schemeClr val="tx2">
-                    <a:lumMod val="75000"/>
-                  </a:schemeClr>
-                </a:solidFill>
-                <a:latin typeface="Verdana" pitchFamily="34" charset="0"/>
-              </a:rPr>
-              <a:t>проекта</a:t>
+              <a:t>Архитектура проекта</a:t>
             </a:r>
             <a:endParaRPr lang="ru-RU" dirty="0">
               <a:solidFill>
@@ -5433,14 +5487,6 @@
               </a:rPr>
               <a:t>.</a:t>
             </a:r>
-            <a:endParaRPr lang="ru-RU" sz="2400" dirty="0" smtClean="0">
-              <a:solidFill>
-                <a:schemeClr val="tx2">
-                  <a:lumMod val="75000"/>
-                </a:schemeClr>
-              </a:solidFill>
-              <a:latin typeface="Verdana" pitchFamily="34" charset="0"/>
-            </a:endParaRPr>
           </a:p>
           <a:p>
             <a:pPr marL="457200" indent="-457200" algn="l" fontAlgn="base">
@@ -5469,14 +5515,6 @@
               </a:rPr>
               <a:t>.</a:t>
             </a:r>
-            <a:endParaRPr lang="ru-RU" sz="2400" dirty="0" smtClean="0">
-              <a:solidFill>
-                <a:schemeClr val="tx2">
-                  <a:lumMod val="75000"/>
-                </a:schemeClr>
-              </a:solidFill>
-              <a:latin typeface="Verdana" pitchFamily="34" charset="0"/>
-            </a:endParaRPr>
           </a:p>
           <a:p>
             <a:pPr marL="457200" indent="-457200" algn="l" fontAlgn="base">
@@ -5689,14 +5727,6 @@
               </a:rPr>
               <a:t>Формировании отчета по участникам.</a:t>
             </a:r>
-            <a:endParaRPr lang="ru-RU" sz="2400" dirty="0" smtClean="0">
-              <a:solidFill>
-                <a:schemeClr val="tx2">
-                  <a:lumMod val="75000"/>
-                </a:schemeClr>
-              </a:solidFill>
-              <a:latin typeface="Verdana" pitchFamily="34" charset="0"/>
-            </a:endParaRPr>
           </a:p>
           <a:p>
             <a:pPr marL="457200" indent="-457200" algn="l" fontAlgn="base">
@@ -5714,14 +5744,6 @@
               </a:rPr>
               <a:t>Формирование отчета по статусу задачи.</a:t>
             </a:r>
-            <a:endParaRPr lang="ru-RU" sz="2400" dirty="0" smtClean="0">
-              <a:solidFill>
-                <a:schemeClr val="tx2">
-                  <a:lumMod val="75000"/>
-                </a:schemeClr>
-              </a:solidFill>
-              <a:latin typeface="Verdana" pitchFamily="34" charset="0"/>
-            </a:endParaRPr>
           </a:p>
           <a:p>
             <a:pPr marL="457200" indent="-457200" algn="l" fontAlgn="base">
@@ -5739,14 +5761,6 @@
               </a:rPr>
               <a:t>Формирование отчета по времени.</a:t>
             </a:r>
-            <a:endParaRPr lang="ru-RU" sz="2400" dirty="0" smtClean="0">
-              <a:solidFill>
-                <a:schemeClr val="tx2">
-                  <a:lumMod val="75000"/>
-                </a:schemeClr>
-              </a:solidFill>
-              <a:latin typeface="Verdana" pitchFamily="34" charset="0"/>
-            </a:endParaRPr>
           </a:p>
           <a:p>
             <a:pPr marL="457200" indent="-457200" algn="l" fontAlgn="base">
@@ -5762,18 +5776,7 @@
                 </a:solidFill>
                 <a:latin typeface="Verdana" pitchFamily="34" charset="0"/>
               </a:rPr>
-              <a:t>Администрирование пользователей</a:t>
-            </a:r>
-            <a:r>
-              <a:rPr lang="ru-RU" sz="2400" dirty="0" smtClean="0">
-                <a:solidFill>
-                  <a:schemeClr val="tx2">
-                    <a:lumMod val="75000"/>
-                  </a:schemeClr>
-                </a:solidFill>
-                <a:latin typeface="Verdana" pitchFamily="34" charset="0"/>
-              </a:rPr>
-              <a:t>.</a:t>
+              <a:t>Администрирование пользователей.</a:t>
             </a:r>
             <a:endParaRPr lang="en-US" sz="2400" dirty="0" smtClean="0">
               <a:solidFill>
@@ -6145,51 +6148,7 @@
                 </a:solidFill>
                 <a:latin typeface="Verdana" pitchFamily="34" charset="0"/>
               </a:rPr>
-              <a:t>JIRA </a:t>
-            </a:r>
-            <a:r>
-              <a:rPr lang="en-US" dirty="0" smtClean="0">
-                <a:solidFill>
-                  <a:schemeClr val="tx2">
-                    <a:lumMod val="75000"/>
-                  </a:schemeClr>
-                </a:solidFill>
-                <a:latin typeface="Verdana" pitchFamily="34" charset="0"/>
-              </a:rPr>
-              <a:t>Service</a:t>
-            </a:r>
-            <a:r>
-              <a:rPr lang="en-US" dirty="0" smtClean="0">
-                <a:solidFill>
-                  <a:schemeClr val="tx2">
-                    <a:lumMod val="75000"/>
-                  </a:schemeClr>
-                </a:solidFill>
-                <a:latin typeface="Verdana" pitchFamily="34" charset="0"/>
-              </a:rPr>
-              <a:t>s</a:t>
-            </a:r>
-            <a:r>
-              <a:rPr lang="en-US" dirty="0" smtClean="0">
-                <a:solidFill>
-                  <a:schemeClr val="tx2">
-                    <a:lumMod val="75000"/>
-                  </a:schemeClr>
-                </a:solidFill>
-                <a:latin typeface="Verdana" pitchFamily="34" charset="0"/>
-              </a:rPr>
-              <a:t> </a:t>
-            </a:r>
-            <a:r>
-              <a:rPr lang="en-US" dirty="0" smtClean="0">
-                <a:solidFill>
-                  <a:schemeClr val="tx2">
-                    <a:lumMod val="75000"/>
-                  </a:schemeClr>
-                </a:solidFill>
-                <a:latin typeface="Verdana" pitchFamily="34" charset="0"/>
-              </a:rPr>
-              <a:t>Layer</a:t>
+              <a:t>JIRA Services Layer</a:t>
             </a:r>
             <a:endParaRPr lang="ru-RU" dirty="0">
               <a:solidFill>

</xml_diff>

<commit_message>
Added slides and images. Changed slide sequence.
</commit_message>
<xml_diff>
--- a/presentation/jastt.pptx
+++ b/presentation/jastt.pptx
@@ -5,10 +5,10 @@
     <p:sldMasterId id="2147483648" r:id="rId1"/>
   </p:sldMasterIdLst>
   <p:notesMasterIdLst>
-    <p:notesMasterId r:id="rId18"/>
+    <p:notesMasterId r:id="rId23"/>
   </p:notesMasterIdLst>
   <p:handoutMasterIdLst>
-    <p:handoutMasterId r:id="rId19"/>
+    <p:handoutMasterId r:id="rId24"/>
   </p:handoutMasterIdLst>
   <p:sldIdLst>
     <p:sldId id="256" r:id="rId2"/>
@@ -17,16 +17,21 @@
     <p:sldId id="266" r:id="rId5"/>
     <p:sldId id="258" r:id="rId6"/>
     <p:sldId id="261" r:id="rId7"/>
-    <p:sldId id="260" r:id="rId8"/>
-    <p:sldId id="262" r:id="rId9"/>
-    <p:sldId id="263" r:id="rId10"/>
-    <p:sldId id="267" r:id="rId11"/>
-    <p:sldId id="268" r:id="rId12"/>
-    <p:sldId id="269" r:id="rId13"/>
-    <p:sldId id="271" r:id="rId14"/>
-    <p:sldId id="270" r:id="rId15"/>
-    <p:sldId id="264" r:id="rId16"/>
-    <p:sldId id="257" r:id="rId17"/>
+    <p:sldId id="273" r:id="rId8"/>
+    <p:sldId id="274" r:id="rId9"/>
+    <p:sldId id="275" r:id="rId10"/>
+    <p:sldId id="260" r:id="rId11"/>
+    <p:sldId id="262" r:id="rId12"/>
+    <p:sldId id="263" r:id="rId13"/>
+    <p:sldId id="267" r:id="rId14"/>
+    <p:sldId id="268" r:id="rId15"/>
+    <p:sldId id="269" r:id="rId16"/>
+    <p:sldId id="271" r:id="rId17"/>
+    <p:sldId id="270" r:id="rId18"/>
+    <p:sldId id="264" r:id="rId19"/>
+    <p:sldId id="257" r:id="rId20"/>
+    <p:sldId id="272" r:id="rId21"/>
+    <p:sldId id="276" r:id="rId22"/>
   </p:sldIdLst>
   <p:sldSz cx="9144000" cy="6858000" type="screen4x3"/>
   <p:notesSz cx="6858000" cy="9144000"/>
@@ -3740,6 +3745,7 @@
           </a:bodyPr>
           <a:lstStyle/>
           <a:p>
+            <a:pPr algn="r"/>
             <a:r>
               <a:rPr lang="ru-RU" dirty="0" smtClean="0">
                 <a:solidFill>
@@ -3753,6 +3759,7 @@
             </a:r>
           </a:p>
           <a:p>
+            <a:pPr algn="r"/>
             <a:r>
               <a:rPr lang="ru-RU" dirty="0" smtClean="0">
                 <a:solidFill>
@@ -3766,6 +3773,7 @@
             </a:r>
           </a:p>
           <a:p>
+            <a:pPr algn="r"/>
             <a:r>
               <a:rPr lang="ru-RU" dirty="0" smtClean="0">
                 <a:solidFill>
@@ -3779,6 +3787,7 @@
             </a:r>
           </a:p>
           <a:p>
+            <a:pPr algn="r"/>
             <a:r>
               <a:rPr lang="ru-RU" dirty="0" smtClean="0">
                 <a:solidFill>
@@ -3800,6 +3809,7 @@
             </a:endParaRPr>
           </a:p>
           <a:p>
+            <a:pPr algn="r"/>
             <a:r>
               <a:rPr lang="ru-RU" dirty="0" smtClean="0">
                 <a:solidFill>
@@ -3821,6 +3831,7 @@
             </a:endParaRPr>
           </a:p>
           <a:p>
+            <a:pPr algn="r"/>
             <a:r>
               <a:rPr lang="ru-RU" dirty="0" smtClean="0">
                 <a:solidFill>
@@ -3889,9 +3900,52 @@
           <a:chExt cx="0" cy="0"/>
         </a:xfrm>
       </p:grpSpPr>
+      <p:sp>
+        <p:nvSpPr>
+          <p:cNvPr id="4" name="Заголовок 3"/>
+          <p:cNvSpPr>
+            <a:spLocks noGrp="1"/>
+          </p:cNvSpPr>
+          <p:nvPr>
+            <p:ph type="ctrTitle"/>
+          </p:nvPr>
+        </p:nvSpPr>
+        <p:spPr>
+          <a:xfrm>
+            <a:off x="642910" y="928670"/>
+            <a:ext cx="7772400" cy="928694"/>
+          </a:xfrm>
+          <a:noFill/>
+        </p:spPr>
+        <p:txBody>
+          <a:bodyPr/>
+          <a:lstStyle/>
+          <a:p>
+            <a:r>
+              <a:rPr lang="en-US" dirty="0" smtClean="0">
+                <a:solidFill>
+                  <a:schemeClr val="tx2">
+                    <a:lumMod val="75000"/>
+                  </a:schemeClr>
+                </a:solidFill>
+                <a:latin typeface="Verdana" pitchFamily="34" charset="0"/>
+              </a:rPr>
+              <a:t>JIRA Services Layer</a:t>
+            </a:r>
+            <a:endParaRPr lang="ru-RU" dirty="0">
+              <a:solidFill>
+                <a:schemeClr val="tx2">
+                  <a:lumMod val="75000"/>
+                </a:schemeClr>
+              </a:solidFill>
+              <a:latin typeface="Verdana" pitchFamily="34" charset="0"/>
+            </a:endParaRPr>
+          </a:p>
+        </p:txBody>
+      </p:sp>
       <p:pic>
         <p:nvPicPr>
-          <p:cNvPr id="2" name="Picture 2" descr="C:\repo\project-jastt\presentation\source\login_page.png"/>
+          <p:cNvPr id="2052" name="Picture 4" descr="C:\repo\project-jastt\presentation\uml\JIRA_Services.bmp"/>
           <p:cNvPicPr>
             <a:picLocks noChangeAspect="1" noChangeArrowheads="1"/>
           </p:cNvPicPr>
@@ -3899,15 +3953,15 @@
         </p:nvPicPr>
         <p:blipFill>
           <a:blip r:embed="rId2"/>
-          <a:srcRect r="27672"/>
+          <a:srcRect/>
           <a:stretch>
             <a:fillRect/>
           </a:stretch>
         </p:blipFill>
         <p:spPr bwMode="auto">
           <a:xfrm>
-            <a:off x="285720" y="1000108"/>
-            <a:ext cx="8298718" cy="5040000"/>
+            <a:off x="142844" y="2117826"/>
+            <a:ext cx="8969176" cy="3240000"/>
           </a:xfrm>
           <a:prstGeom prst="rect">
             <a:avLst/>
@@ -3947,9 +4001,52 @@
           <a:chExt cx="0" cy="0"/>
         </a:xfrm>
       </p:grpSpPr>
+      <p:sp>
+        <p:nvSpPr>
+          <p:cNvPr id="4" name="Заголовок 3"/>
+          <p:cNvSpPr>
+            <a:spLocks noGrp="1"/>
+          </p:cNvSpPr>
+          <p:nvPr>
+            <p:ph type="ctrTitle"/>
+          </p:nvPr>
+        </p:nvSpPr>
+        <p:spPr>
+          <a:xfrm>
+            <a:off x="642910" y="928670"/>
+            <a:ext cx="7772400" cy="928694"/>
+          </a:xfrm>
+          <a:noFill/>
+        </p:spPr>
+        <p:txBody>
+          <a:bodyPr/>
+          <a:lstStyle/>
+          <a:p>
+            <a:r>
+              <a:rPr lang="en-US" dirty="0" smtClean="0">
+                <a:solidFill>
+                  <a:schemeClr val="tx2">
+                    <a:lumMod val="75000"/>
+                  </a:schemeClr>
+                </a:solidFill>
+                <a:latin typeface="Verdana" pitchFamily="34" charset="0"/>
+              </a:rPr>
+              <a:t>Business Services</a:t>
+            </a:r>
+            <a:endParaRPr lang="ru-RU" dirty="0">
+              <a:solidFill>
+                <a:schemeClr val="tx2">
+                  <a:lumMod val="75000"/>
+                </a:schemeClr>
+              </a:solidFill>
+              <a:latin typeface="Verdana" pitchFamily="34" charset="0"/>
+            </a:endParaRPr>
+          </a:p>
+        </p:txBody>
+      </p:sp>
       <p:pic>
         <p:nvPicPr>
-          <p:cNvPr id="3074" name="Picture 2" descr="C:\repo\project-jastt\presentation\source\worklog_page.png"/>
+          <p:cNvPr id="5123" name="Picture 3" descr="C:\repo\project-jastt\presentation\uml\Service1.png"/>
           <p:cNvPicPr>
             <a:picLocks noChangeAspect="1" noChangeArrowheads="1"/>
           </p:cNvPicPr>
@@ -3964,8 +4061,8 @@
         </p:blipFill>
         <p:spPr bwMode="auto">
           <a:xfrm>
-            <a:off x="71406" y="1500174"/>
-            <a:ext cx="9015600" cy="3960000"/>
+            <a:off x="214282" y="2071678"/>
+            <a:ext cx="8849298" cy="3240000"/>
           </a:xfrm>
           <a:prstGeom prst="rect">
             <a:avLst/>
@@ -4005,9 +4102,52 @@
           <a:chExt cx="0" cy="0"/>
         </a:xfrm>
       </p:grpSpPr>
+      <p:sp>
+        <p:nvSpPr>
+          <p:cNvPr id="4" name="Заголовок 3"/>
+          <p:cNvSpPr>
+            <a:spLocks noGrp="1"/>
+          </p:cNvSpPr>
+          <p:nvPr>
+            <p:ph type="ctrTitle"/>
+          </p:nvPr>
+        </p:nvSpPr>
+        <p:spPr>
+          <a:xfrm>
+            <a:off x="642910" y="928670"/>
+            <a:ext cx="7772400" cy="928694"/>
+          </a:xfrm>
+          <a:noFill/>
+        </p:spPr>
+        <p:txBody>
+          <a:bodyPr/>
+          <a:lstStyle/>
+          <a:p>
+            <a:r>
+              <a:rPr lang="en-US" dirty="0" smtClean="0">
+                <a:solidFill>
+                  <a:schemeClr val="tx2">
+                    <a:lumMod val="75000"/>
+                  </a:schemeClr>
+                </a:solidFill>
+                <a:latin typeface="Verdana" pitchFamily="34" charset="0"/>
+              </a:rPr>
+              <a:t>Business Services</a:t>
+            </a:r>
+            <a:endParaRPr lang="ru-RU" dirty="0">
+              <a:solidFill>
+                <a:schemeClr val="tx2">
+                  <a:lumMod val="75000"/>
+                </a:schemeClr>
+              </a:solidFill>
+              <a:latin typeface="Verdana" pitchFamily="34" charset="0"/>
+            </a:endParaRPr>
+          </a:p>
+        </p:txBody>
+      </p:sp>
       <p:pic>
         <p:nvPicPr>
-          <p:cNvPr id="4098" name="Picture 2" descr="C:\repo\project-jastt\presentation\source\report_page.png"/>
+          <p:cNvPr id="6146" name="Picture 2" descr="C:\repo\project-jastt\presentation\uml\Service2.png"/>
           <p:cNvPicPr>
             <a:picLocks noChangeAspect="1" noChangeArrowheads="1"/>
           </p:cNvPicPr>
@@ -4022,8 +4162,8 @@
         </p:blipFill>
         <p:spPr bwMode="auto">
           <a:xfrm>
-            <a:off x="71406" y="1469264"/>
-            <a:ext cx="9015600" cy="3960000"/>
+            <a:off x="142844" y="2143116"/>
+            <a:ext cx="8886370" cy="3240000"/>
           </a:xfrm>
           <a:prstGeom prst="rect">
             <a:avLst/>
@@ -4063,33 +4203,9 @@
           <a:chExt cx="0" cy="0"/>
         </a:xfrm>
       </p:grpSpPr>
-      <p:sp>
-        <p:nvSpPr>
-          <p:cNvPr id="5" name="Номер слайда 4"/>
-          <p:cNvSpPr>
-            <a:spLocks noGrp="1"/>
-          </p:cNvSpPr>
-          <p:nvPr>
-            <p:ph type="sldNum" sz="quarter" idx="12"/>
-          </p:nvPr>
-        </p:nvSpPr>
-        <p:spPr/>
-        <p:txBody>
-          <a:bodyPr/>
-          <a:lstStyle/>
-          <a:p>
-            <a:fld id="{11D68980-9ECF-4181-A23B-CB36B8F9F50A}" type="slidenum">
-              <a:rPr lang="ru-RU" smtClean="0"/>
-              <a:pPr/>
-              <a:t>13</a:t>
-            </a:fld>
-            <a:endParaRPr lang="ru-RU"/>
-          </a:p>
-        </p:txBody>
-      </p:sp>
       <p:pic>
         <p:nvPicPr>
-          <p:cNvPr id="1026" name="Picture 2" descr="C:\repo\project-jastt\presentation\source\report(pdf).png"/>
+          <p:cNvPr id="2" name="Picture 2" descr="C:\repo\project-jastt\presentation\source\login_page.png"/>
           <p:cNvPicPr>
             <a:picLocks noChangeAspect="1" noChangeArrowheads="1"/>
           </p:cNvPicPr>
@@ -4097,15 +4213,15 @@
         </p:nvPicPr>
         <p:blipFill>
           <a:blip r:embed="rId2"/>
-          <a:srcRect/>
+          <a:srcRect r="27672"/>
           <a:stretch>
             <a:fillRect/>
           </a:stretch>
         </p:blipFill>
         <p:spPr bwMode="auto">
           <a:xfrm>
-            <a:off x="214282" y="1571612"/>
-            <a:ext cx="8713340" cy="4320000"/>
+            <a:off x="285720" y="1000108"/>
+            <a:ext cx="8298718" cy="5040000"/>
           </a:xfrm>
           <a:prstGeom prst="rect">
             <a:avLst/>
@@ -4118,6 +4234,13 @@
   <p:clrMapOvr>
     <a:masterClrMapping/>
   </p:clrMapOvr>
+  <p:timing>
+    <p:tnLst>
+      <p:par>
+        <p:cTn id="1" dur="indefinite" restart="never" nodeType="tmRoot"/>
+      </p:par>
+    </p:tnLst>
+  </p:timing>
 </p:sld>
 </file>
 
@@ -4138,77 +4261,13 @@
           <a:chExt cx="0" cy="0"/>
         </a:xfrm>
       </p:grpSpPr>
-      <p:sp>
-        <p:nvSpPr>
-          <p:cNvPr id="2" name="Заголовок 1"/>
-          <p:cNvSpPr>
-            <a:spLocks noGrp="1"/>
-          </p:cNvSpPr>
-          <p:nvPr>
-            <p:ph type="title"/>
-          </p:nvPr>
-        </p:nvSpPr>
-        <p:spPr/>
-        <p:txBody>
-          <a:bodyPr/>
-          <a:lstStyle/>
-          <a:p>
-            <a:endParaRPr lang="ru-RU"/>
-          </a:p>
-        </p:txBody>
-      </p:sp>
-      <p:sp>
-        <p:nvSpPr>
-          <p:cNvPr id="4" name="Нижний колонтитул 3"/>
-          <p:cNvSpPr>
-            <a:spLocks noGrp="1"/>
-          </p:cNvSpPr>
-          <p:nvPr>
-            <p:ph type="ftr" sz="quarter" idx="11"/>
-          </p:nvPr>
-        </p:nvSpPr>
-        <p:spPr/>
-        <p:txBody>
-          <a:bodyPr/>
-          <a:lstStyle/>
-          <a:p>
-            <a:endParaRPr lang="ru-RU"/>
-          </a:p>
-        </p:txBody>
-      </p:sp>
-      <p:sp>
-        <p:nvSpPr>
-          <p:cNvPr id="5" name="Номер слайда 4"/>
-          <p:cNvSpPr>
-            <a:spLocks noGrp="1"/>
-          </p:cNvSpPr>
-          <p:nvPr>
-            <p:ph type="sldNum" sz="quarter" idx="12"/>
-          </p:nvPr>
-        </p:nvSpPr>
-        <p:spPr/>
-        <p:txBody>
-          <a:bodyPr/>
-          <a:lstStyle/>
-          <a:p>
-            <a:fld id="{11D68980-9ECF-4181-A23B-CB36B8F9F50A}" type="slidenum">
-              <a:rPr lang="ru-RU" smtClean="0"/>
-              <a:pPr/>
-              <a:t>14</a:t>
-            </a:fld>
-            <a:endParaRPr lang="ru-RU"/>
-          </a:p>
-        </p:txBody>
-      </p:sp>
       <p:pic>
         <p:nvPicPr>
-          <p:cNvPr id="5122" name="Picture 2" descr="C:\repo\project-jastt\presentation\source\admin_page.png"/>
+          <p:cNvPr id="3074" name="Picture 2" descr="C:\repo\project-jastt\presentation\source\worklog_page.png"/>
           <p:cNvPicPr>
-            <a:picLocks noGrp="1" noChangeAspect="1" noChangeArrowheads="1"/>
+            <a:picLocks noChangeAspect="1" noChangeArrowheads="1"/>
           </p:cNvPicPr>
-          <p:nvPr>
-            <p:ph idx="1"/>
-          </p:nvPr>
+          <p:nvPr/>
         </p:nvPicPr>
         <p:blipFill>
           <a:blip r:embed="rId2"/>
@@ -4219,8 +4278,8 @@
         </p:blipFill>
         <p:spPr bwMode="auto">
           <a:xfrm>
-            <a:off x="285720" y="2071678"/>
-            <a:ext cx="8605801" cy="3780000"/>
+            <a:off x="71406" y="1500174"/>
+            <a:ext cx="9015600" cy="3960000"/>
           </a:xfrm>
           <a:prstGeom prst="rect">
             <a:avLst/>
@@ -4233,6 +4292,13 @@
   <p:clrMapOvr>
     <a:masterClrMapping/>
   </p:clrMapOvr>
+  <p:timing>
+    <p:tnLst>
+      <p:par>
+        <p:cTn id="1" dur="indefinite" restart="never" nodeType="tmRoot"/>
+      </p:par>
+    </p:tnLst>
+  </p:timing>
 </p:sld>
 </file>
 
@@ -4253,124 +4319,16 @@
           <a:chExt cx="0" cy="0"/>
         </a:xfrm>
       </p:grpSpPr>
-      <p:sp>
-        <p:nvSpPr>
-          <p:cNvPr id="4" name="Заголовок 3"/>
-          <p:cNvSpPr>
-            <a:spLocks noGrp="1"/>
-          </p:cNvSpPr>
-          <p:nvPr>
-            <p:ph type="ctrTitle"/>
-          </p:nvPr>
-        </p:nvSpPr>
-        <p:spPr>
-          <a:xfrm>
-            <a:off x="642910" y="928670"/>
-            <a:ext cx="7772400" cy="928694"/>
-          </a:xfrm>
-          <a:noFill/>
-        </p:spPr>
-        <p:txBody>
-          <a:bodyPr>
-            <a:normAutofit/>
-          </a:bodyPr>
-          <a:lstStyle/>
-          <a:p>
-            <a:r>
-              <a:rPr lang="ru-RU" sz="3600" dirty="0" smtClean="0">
-                <a:solidFill>
-                  <a:schemeClr val="tx2">
-                    <a:lumMod val="75000"/>
-                  </a:schemeClr>
-                </a:solidFill>
-                <a:latin typeface="Verdana" pitchFamily="34" charset="0"/>
-              </a:rPr>
-              <a:t>Используемые технологии</a:t>
-            </a:r>
-            <a:endParaRPr lang="ru-RU" sz="3600" dirty="0">
-              <a:solidFill>
-                <a:schemeClr val="tx2">
-                  <a:lumMod val="75000"/>
-                </a:schemeClr>
-              </a:solidFill>
-              <a:latin typeface="Verdana" pitchFamily="34" charset="0"/>
-            </a:endParaRPr>
-          </a:p>
-        </p:txBody>
-      </p:sp>
-      <p:sp>
-        <p:nvSpPr>
-          <p:cNvPr id="5" name="Заголовок 2"/>
-          <p:cNvSpPr txBox="1">
-            <a:spLocks/>
-          </p:cNvSpPr>
-          <p:nvPr/>
-        </p:nvSpPr>
-        <p:spPr>
-          <a:xfrm>
-            <a:off x="457200" y="338328"/>
-            <a:ext cx="8229600" cy="1252728"/>
-          </a:xfrm>
-          <a:prstGeom prst="rect">
-            <a:avLst/>
-          </a:prstGeom>
-        </p:spPr>
-        <p:txBody>
-          <a:bodyPr vert="horz" lIns="91440" tIns="45720" rIns="91440" bIns="45720" rtlCol="0" anchor="ctr">
-            <a:normAutofit/>
-          </a:bodyPr>
-          <a:lstStyle/>
-          <a:p>
-            <a:pPr marL="0" marR="0" lvl="0" indent="0" algn="ctr" defTabSz="914400" rtl="0" eaLnBrk="1" fontAlgn="auto" latinLnBrk="0" hangingPunct="1">
-              <a:lnSpc>
-                <a:spcPct val="100000"/>
-              </a:lnSpc>
-              <a:spcBef>
-                <a:spcPct val="0"/>
-              </a:spcBef>
-              <a:spcAft>
-                <a:spcPts val="0"/>
-              </a:spcAft>
-              <a:buClrTx/>
-              <a:buSzTx/>
-              <a:buFontTx/>
-              <a:buNone/>
-              <a:tabLst/>
-              <a:defRPr/>
-            </a:pPr>
-            <a:endParaRPr kumimoji="0" lang="ru-RU" sz="4400" b="0" i="0" u="none" strike="noStrike" kern="1200" cap="none" spc="0" normalizeH="0" baseline="0" noProof="0" dirty="0">
-              <a:ln>
-                <a:noFill/>
-              </a:ln>
-              <a:solidFill>
-                <a:schemeClr val="tx1"/>
-              </a:solidFill>
-              <a:effectLst/>
-              <a:uLnTx/>
-              <a:uFillTx/>
-              <a:latin typeface="+mj-lt"/>
-              <a:ea typeface="+mj-ea"/>
-              <a:cs typeface="+mj-cs"/>
-            </a:endParaRPr>
-          </a:p>
-        </p:txBody>
-      </p:sp>
       <p:pic>
         <p:nvPicPr>
-          <p:cNvPr id="6" name="Picture 3"/>
+          <p:cNvPr id="4098" name="Picture 2" descr="C:\repo\project-jastt\presentation\source\report_page.png"/>
           <p:cNvPicPr>
             <a:picLocks noChangeAspect="1" noChangeArrowheads="1"/>
           </p:cNvPicPr>
           <p:nvPr/>
         </p:nvPicPr>
         <p:blipFill>
-          <a:blip r:embed="rId2" cstate="print">
-            <a:extLst>
-              <a:ext uri="{28A0092B-C50C-407E-A947-70E740481C1C}">
-                <a14:useLocalDpi xmlns:a14="http://schemas.microsoft.com/office/drawing/2010/main" xmlns="" val="0"/>
-              </a:ext>
-            </a:extLst>
-          </a:blip>
+          <a:blip r:embed="rId2"/>
           <a:srcRect/>
           <a:stretch>
             <a:fillRect/>
@@ -4378,566 +4336,8 @@
         </p:blipFill>
         <p:spPr bwMode="auto">
           <a:xfrm>
-            <a:off x="1643042" y="5429264"/>
-            <a:ext cx="1903413" cy="436563"/>
-          </a:xfrm>
-          <a:prstGeom prst="rect">
-            <a:avLst/>
-          </a:prstGeom>
-          <a:noFill/>
-          <a:ln>
-            <a:noFill/>
-          </a:ln>
-          <a:effectLst/>
-          <a:extLst>
-            <a:ext uri="{909E8E84-426E-40DD-AFC4-6F175D3DCCD1}">
-              <a14:hiddenFill xmlns:a14="http://schemas.microsoft.com/office/drawing/2010/main" xmlns="">
-                <a:blipFill dpi="0" rotWithShape="0">
-                  <a:blip/>
-                  <a:srcRect/>
-                  <a:stretch>
-                    <a:fillRect/>
-                  </a:stretch>
-                </a:blipFill>
-              </a14:hiddenFill>
-            </a:ext>
-            <a:ext uri="{91240B29-F687-4F45-9708-019B960494DF}">
-              <a14:hiddenLine xmlns:a14="http://schemas.microsoft.com/office/drawing/2010/main" xmlns="" w="9525">
-                <a:solidFill>
-                  <a:srgbClr val="808080"/>
-                </a:solidFill>
-                <a:round/>
-                <a:headEnd/>
-                <a:tailEnd/>
-              </a14:hiddenLine>
-            </a:ext>
-            <a:ext uri="{AF507438-7753-43E0-B8FC-AC1667EBCBE1}">
-              <a14:hiddenEffects xmlns:a14="http://schemas.microsoft.com/office/drawing/2010/main" xmlns="">
-                <a:effectLst>
-                  <a:outerShdw dist="35921" dir="2700000" algn="ctr" rotWithShape="0">
-                    <a:srgbClr val="808080"/>
-                  </a:outerShdw>
-                </a:effectLst>
-              </a14:hiddenEffects>
-            </a:ext>
-          </a:extLst>
-        </p:spPr>
-      </p:pic>
-      <p:pic>
-        <p:nvPicPr>
-          <p:cNvPr id="10" name="Picture 5"/>
-          <p:cNvPicPr>
-            <a:picLocks noChangeAspect="1" noChangeArrowheads="1"/>
-          </p:cNvPicPr>
-          <p:nvPr/>
-        </p:nvPicPr>
-        <p:blipFill>
-          <a:blip r:embed="rId3" cstate="print">
-            <a:extLst>
-              <a:ext uri="{28A0092B-C50C-407E-A947-70E740481C1C}">
-                <a14:useLocalDpi xmlns:a14="http://schemas.microsoft.com/office/drawing/2010/main" xmlns="" val="0"/>
-              </a:ext>
-            </a:extLst>
-          </a:blip>
-          <a:srcRect/>
-          <a:stretch>
-            <a:fillRect/>
-          </a:stretch>
-        </p:blipFill>
-        <p:spPr bwMode="auto">
-          <a:xfrm>
-            <a:off x="1928794" y="4500570"/>
-            <a:ext cx="1136650" cy="763588"/>
-          </a:xfrm>
-          <a:prstGeom prst="rect">
-            <a:avLst/>
-          </a:prstGeom>
-          <a:noFill/>
-          <a:ln>
-            <a:noFill/>
-          </a:ln>
-          <a:effectLst/>
-          <a:extLst>
-            <a:ext uri="{909E8E84-426E-40DD-AFC4-6F175D3DCCD1}">
-              <a14:hiddenFill xmlns:a14="http://schemas.microsoft.com/office/drawing/2010/main" xmlns="">
-                <a:blipFill dpi="0" rotWithShape="0">
-                  <a:blip/>
-                  <a:srcRect/>
-                  <a:stretch>
-                    <a:fillRect/>
-                  </a:stretch>
-                </a:blipFill>
-              </a14:hiddenFill>
-            </a:ext>
-            <a:ext uri="{91240B29-F687-4F45-9708-019B960494DF}">
-              <a14:hiddenLine xmlns:a14="http://schemas.microsoft.com/office/drawing/2010/main" xmlns="" w="9525">
-                <a:solidFill>
-                  <a:srgbClr val="808080"/>
-                </a:solidFill>
-                <a:round/>
-                <a:headEnd/>
-                <a:tailEnd/>
-              </a14:hiddenLine>
-            </a:ext>
-            <a:ext uri="{AF507438-7753-43E0-B8FC-AC1667EBCBE1}">
-              <a14:hiddenEffects xmlns:a14="http://schemas.microsoft.com/office/drawing/2010/main" xmlns="">
-                <a:effectLst>
-                  <a:outerShdw dist="35921" dir="2700000" algn="ctr" rotWithShape="0">
-                    <a:srgbClr val="808080"/>
-                  </a:outerShdw>
-                </a:effectLst>
-              </a14:hiddenEffects>
-            </a:ext>
-          </a:extLst>
-        </p:spPr>
-      </p:pic>
-      <p:pic>
-        <p:nvPicPr>
-          <p:cNvPr id="11" name="Picture 15"/>
-          <p:cNvPicPr>
-            <a:picLocks noChangeAspect="1" noChangeArrowheads="1"/>
-          </p:cNvPicPr>
-          <p:nvPr/>
-        </p:nvPicPr>
-        <p:blipFill>
-          <a:blip r:embed="rId4" cstate="print">
-            <a:extLst>
-              <a:ext uri="{28A0092B-C50C-407E-A947-70E740481C1C}">
-                <a14:useLocalDpi xmlns:a14="http://schemas.microsoft.com/office/drawing/2010/main" xmlns="" val="0"/>
-              </a:ext>
-            </a:extLst>
-          </a:blip>
-          <a:srcRect/>
-          <a:stretch>
-            <a:fillRect/>
-          </a:stretch>
-        </p:blipFill>
-        <p:spPr bwMode="auto">
-          <a:xfrm>
-            <a:off x="6072198" y="4786322"/>
-            <a:ext cx="2395537" cy="442913"/>
-          </a:xfrm>
-          <a:prstGeom prst="rect">
-            <a:avLst/>
-          </a:prstGeom>
-          <a:noFill/>
-          <a:ln>
-            <a:noFill/>
-          </a:ln>
-          <a:effectLst/>
-          <a:extLst>
-            <a:ext uri="{909E8E84-426E-40DD-AFC4-6F175D3DCCD1}">
-              <a14:hiddenFill xmlns:a14="http://schemas.microsoft.com/office/drawing/2010/main" xmlns="">
-                <a:blipFill dpi="0" rotWithShape="0">
-                  <a:blip/>
-                  <a:srcRect/>
-                  <a:stretch>
-                    <a:fillRect/>
-                  </a:stretch>
-                </a:blipFill>
-              </a14:hiddenFill>
-            </a:ext>
-            <a:ext uri="{91240B29-F687-4F45-9708-019B960494DF}">
-              <a14:hiddenLine xmlns:a14="http://schemas.microsoft.com/office/drawing/2010/main" xmlns="" w="9525">
-                <a:solidFill>
-                  <a:srgbClr val="808080"/>
-                </a:solidFill>
-                <a:round/>
-                <a:headEnd/>
-                <a:tailEnd/>
-              </a14:hiddenLine>
-            </a:ext>
-            <a:ext uri="{AF507438-7753-43E0-B8FC-AC1667EBCBE1}">
-              <a14:hiddenEffects xmlns:a14="http://schemas.microsoft.com/office/drawing/2010/main" xmlns="">
-                <a:effectLst>
-                  <a:outerShdw dist="35921" dir="2700000" algn="ctr" rotWithShape="0">
-                    <a:srgbClr val="808080"/>
-                  </a:outerShdw>
-                </a:effectLst>
-              </a14:hiddenEffects>
-            </a:ext>
-          </a:extLst>
-        </p:spPr>
-      </p:pic>
-      <p:pic>
-        <p:nvPicPr>
-          <p:cNvPr id="13" name="Picture 4"/>
-          <p:cNvPicPr>
-            <a:picLocks noChangeAspect="1" noChangeArrowheads="1"/>
-          </p:cNvPicPr>
-          <p:nvPr/>
-        </p:nvPicPr>
-        <p:blipFill>
-          <a:blip r:embed="rId5" cstate="print">
-            <a:extLst>
-              <a:ext uri="{28A0092B-C50C-407E-A947-70E740481C1C}">
-                <a14:useLocalDpi xmlns:a14="http://schemas.microsoft.com/office/drawing/2010/main" xmlns="" val="0"/>
-              </a:ext>
-            </a:extLst>
-          </a:blip>
-          <a:srcRect/>
-          <a:stretch>
-            <a:fillRect/>
-          </a:stretch>
-        </p:blipFill>
-        <p:spPr bwMode="auto">
-          <a:xfrm>
-            <a:off x="6500826" y="2857496"/>
-            <a:ext cx="2049883" cy="720000"/>
-          </a:xfrm>
-          <a:prstGeom prst="rect">
-            <a:avLst/>
-          </a:prstGeom>
-          <a:noFill/>
-          <a:ln>
-            <a:noFill/>
-          </a:ln>
-          <a:extLst>
-            <a:ext uri="{909E8E84-426E-40DD-AFC4-6F175D3DCCD1}">
-              <a14:hiddenFill xmlns:a14="http://schemas.microsoft.com/office/drawing/2010/main" xmlns="">
-                <a:solidFill>
-                  <a:schemeClr val="accent1"/>
-                </a:solidFill>
-              </a14:hiddenFill>
-            </a:ext>
-            <a:ext uri="{91240B29-F687-4F45-9708-019B960494DF}">
-              <a14:hiddenLine xmlns:a14="http://schemas.microsoft.com/office/drawing/2010/main" xmlns="" w="9525">
-                <a:solidFill>
-                  <a:schemeClr val="tx1"/>
-                </a:solidFill>
-                <a:miter lim="800000"/>
-                <a:headEnd/>
-                <a:tailEnd/>
-              </a14:hiddenLine>
-            </a:ext>
-          </a:extLst>
-        </p:spPr>
-      </p:pic>
-      <p:pic>
-        <p:nvPicPr>
-          <p:cNvPr id="14" name="Picture 14"/>
-          <p:cNvPicPr>
-            <a:picLocks noChangeAspect="1" noChangeArrowheads="1"/>
-          </p:cNvPicPr>
-          <p:nvPr/>
-        </p:nvPicPr>
-        <p:blipFill>
-          <a:blip r:embed="rId6" cstate="print">
-            <a:extLst>
-              <a:ext uri="{28A0092B-C50C-407E-A947-70E740481C1C}">
-                <a14:useLocalDpi xmlns:a14="http://schemas.microsoft.com/office/drawing/2010/main" xmlns="" val="0"/>
-              </a:ext>
-            </a:extLst>
-          </a:blip>
-          <a:srcRect/>
-          <a:stretch>
-            <a:fillRect/>
-          </a:stretch>
-        </p:blipFill>
-        <p:spPr bwMode="auto">
-          <a:xfrm>
-            <a:off x="714348" y="2428868"/>
-            <a:ext cx="2370137" cy="741362"/>
-          </a:xfrm>
-          <a:prstGeom prst="rect">
-            <a:avLst/>
-          </a:prstGeom>
-          <a:noFill/>
-          <a:ln>
-            <a:noFill/>
-          </a:ln>
-          <a:effectLst/>
-          <a:extLst>
-            <a:ext uri="{909E8E84-426E-40DD-AFC4-6F175D3DCCD1}">
-              <a14:hiddenFill xmlns:a14="http://schemas.microsoft.com/office/drawing/2010/main" xmlns="">
-                <a:blipFill dpi="0" rotWithShape="0">
-                  <a:blip/>
-                  <a:srcRect/>
-                  <a:stretch>
-                    <a:fillRect/>
-                  </a:stretch>
-                </a:blipFill>
-              </a14:hiddenFill>
-            </a:ext>
-            <a:ext uri="{91240B29-F687-4F45-9708-019B960494DF}">
-              <a14:hiddenLine xmlns:a14="http://schemas.microsoft.com/office/drawing/2010/main" xmlns="" w="9525">
-                <a:solidFill>
-                  <a:srgbClr val="808080"/>
-                </a:solidFill>
-                <a:round/>
-                <a:headEnd/>
-                <a:tailEnd/>
-              </a14:hiddenLine>
-            </a:ext>
-            <a:ext uri="{AF507438-7753-43E0-B8FC-AC1667EBCBE1}">
-              <a14:hiddenEffects xmlns:a14="http://schemas.microsoft.com/office/drawing/2010/main" xmlns="">
-                <a:effectLst>
-                  <a:outerShdw dist="35921" dir="2700000" algn="ctr" rotWithShape="0">
-                    <a:srgbClr val="808080"/>
-                  </a:outerShdw>
-                </a:effectLst>
-              </a14:hiddenEffects>
-            </a:ext>
-          </a:extLst>
-        </p:spPr>
-      </p:pic>
-      <p:pic>
-        <p:nvPicPr>
-          <p:cNvPr id="16" name="Picture 13"/>
-          <p:cNvPicPr>
-            <a:picLocks noChangeAspect="1" noChangeArrowheads="1"/>
-          </p:cNvPicPr>
-          <p:nvPr/>
-        </p:nvPicPr>
-        <p:blipFill>
-          <a:blip r:embed="rId7" cstate="print">
-            <a:extLst>
-              <a:ext uri="{28A0092B-C50C-407E-A947-70E740481C1C}">
-                <a14:useLocalDpi xmlns:a14="http://schemas.microsoft.com/office/drawing/2010/main" xmlns="" val="0"/>
-              </a:ext>
-            </a:extLst>
-          </a:blip>
-          <a:srcRect/>
-          <a:stretch>
-            <a:fillRect/>
-          </a:stretch>
-        </p:blipFill>
-        <p:spPr bwMode="auto">
-          <a:xfrm>
-            <a:off x="1428728" y="3929066"/>
-            <a:ext cx="1663945" cy="360000"/>
-          </a:xfrm>
-          <a:prstGeom prst="rect">
-            <a:avLst/>
-          </a:prstGeom>
-          <a:noFill/>
-          <a:ln>
-            <a:noFill/>
-          </a:ln>
-          <a:effectLst/>
-          <a:extLst>
-            <a:ext uri="{909E8E84-426E-40DD-AFC4-6F175D3DCCD1}">
-              <a14:hiddenFill xmlns:a14="http://schemas.microsoft.com/office/drawing/2010/main" xmlns="">
-                <a:blipFill dpi="0" rotWithShape="0">
-                  <a:blip/>
-                  <a:srcRect/>
-                  <a:stretch>
-                    <a:fillRect/>
-                  </a:stretch>
-                </a:blipFill>
-              </a14:hiddenFill>
-            </a:ext>
-            <a:ext uri="{91240B29-F687-4F45-9708-019B960494DF}">
-              <a14:hiddenLine xmlns:a14="http://schemas.microsoft.com/office/drawing/2010/main" xmlns="" w="9525">
-                <a:solidFill>
-                  <a:srgbClr val="808080"/>
-                </a:solidFill>
-                <a:round/>
-                <a:headEnd/>
-                <a:tailEnd/>
-              </a14:hiddenLine>
-            </a:ext>
-            <a:ext uri="{AF507438-7753-43E0-B8FC-AC1667EBCBE1}">
-              <a14:hiddenEffects xmlns:a14="http://schemas.microsoft.com/office/drawing/2010/main" xmlns="">
-                <a:effectLst>
-                  <a:outerShdw dist="35921" dir="2700000" algn="ctr" rotWithShape="0">
-                    <a:srgbClr val="808080"/>
-                  </a:outerShdw>
-                </a:effectLst>
-              </a14:hiddenEffects>
-            </a:ext>
-          </a:extLst>
-        </p:spPr>
-      </p:pic>
-      <p:pic>
-        <p:nvPicPr>
-          <p:cNvPr id="19" name="Picture 7"/>
-          <p:cNvPicPr>
-            <a:picLocks noChangeAspect="1" noChangeArrowheads="1"/>
-          </p:cNvPicPr>
-          <p:nvPr/>
-        </p:nvPicPr>
-        <p:blipFill>
-          <a:blip r:embed="rId8"/>
-          <a:srcRect/>
-          <a:stretch>
-            <a:fillRect/>
-          </a:stretch>
-        </p:blipFill>
-        <p:spPr bwMode="auto">
-          <a:xfrm>
-            <a:off x="6643702" y="3929066"/>
-            <a:ext cx="1703387" cy="436563"/>
-          </a:xfrm>
-          <a:prstGeom prst="rect">
-            <a:avLst/>
-          </a:prstGeom>
-          <a:noFill/>
-          <a:ln w="9525">
-            <a:noFill/>
-            <a:round/>
-            <a:headEnd/>
-            <a:tailEnd/>
-          </a:ln>
-          <a:effectLst/>
-        </p:spPr>
-      </p:pic>
-      <p:pic>
-        <p:nvPicPr>
-          <p:cNvPr id="1026" name="Picture 2" descr="C:\Users\Андрей\Downloads\jaspersoft-jasperreports-logo.jpg"/>
-          <p:cNvPicPr>
-            <a:picLocks noChangeAspect="1" noChangeArrowheads="1"/>
-          </p:cNvPicPr>
-          <p:nvPr/>
-        </p:nvPicPr>
-        <p:blipFill>
-          <a:blip r:embed="rId9"/>
-          <a:srcRect t="41809" b="41809"/>
-          <a:stretch>
-            <a:fillRect/>
-          </a:stretch>
-        </p:blipFill>
-        <p:spPr bwMode="auto">
-          <a:xfrm>
-            <a:off x="3571868" y="5357826"/>
-            <a:ext cx="3296650" cy="540000"/>
-          </a:xfrm>
-          <a:prstGeom prst="rect">
-            <a:avLst/>
-          </a:prstGeom>
-          <a:noFill/>
-        </p:spPr>
-      </p:pic>
-      <p:pic>
-        <p:nvPicPr>
-          <p:cNvPr id="1027" name="Picture 3" descr="C:\Users\Андрей\Downloads\Tomcat 7.png"/>
-          <p:cNvPicPr>
-            <a:picLocks noChangeAspect="1" noChangeArrowheads="1"/>
-          </p:cNvPicPr>
-          <p:nvPr/>
-        </p:nvPicPr>
-        <p:blipFill>
-          <a:blip r:embed="rId10"/>
-          <a:srcRect/>
-          <a:stretch>
-            <a:fillRect/>
-          </a:stretch>
-        </p:blipFill>
-        <p:spPr bwMode="auto">
-          <a:xfrm>
-            <a:off x="4572000" y="1714488"/>
-            <a:ext cx="1800000" cy="900000"/>
-          </a:xfrm>
-          <a:prstGeom prst="rect">
-            <a:avLst/>
-          </a:prstGeom>
-          <a:noFill/>
-        </p:spPr>
-      </p:pic>
-      <p:pic>
-        <p:nvPicPr>
-          <p:cNvPr id="1028" name="Picture 4" descr="C:\Users\Андрей\Downloads\java-logo.png"/>
-          <p:cNvPicPr>
-            <a:picLocks noChangeAspect="1" noChangeArrowheads="1"/>
-          </p:cNvPicPr>
-          <p:nvPr/>
-        </p:nvPicPr>
-        <p:blipFill>
-          <a:blip r:embed="rId11"/>
-          <a:srcRect l="16798" t="8399" r="16798" b="8399"/>
-          <a:stretch>
-            <a:fillRect/>
-          </a:stretch>
-        </p:blipFill>
-        <p:spPr bwMode="auto">
-          <a:xfrm>
-            <a:off x="4071934" y="3071810"/>
-            <a:ext cx="1147474" cy="1437726"/>
-          </a:xfrm>
-          <a:prstGeom prst="rect">
-            <a:avLst/>
-          </a:prstGeom>
-          <a:noFill/>
-        </p:spPr>
-      </p:pic>
-      <p:pic>
-        <p:nvPicPr>
-          <p:cNvPr id="1029" name="Picture 5" descr="C:\Users\Андрей\Downloads\Spring Logo2.png"/>
-          <p:cNvPicPr>
-            <a:picLocks noChangeAspect="1" noChangeArrowheads="1"/>
-          </p:cNvPicPr>
-          <p:nvPr/>
-        </p:nvPicPr>
-        <p:blipFill>
-          <a:blip r:embed="rId12"/>
-          <a:srcRect l="13760" t="9294" r="13760" b="9294"/>
-          <a:stretch>
-            <a:fillRect/>
-          </a:stretch>
-        </p:blipFill>
-        <p:spPr bwMode="auto">
-          <a:xfrm>
-            <a:off x="2786050" y="1857364"/>
-            <a:ext cx="1623473" cy="540000"/>
-          </a:xfrm>
-          <a:prstGeom prst="rect">
-            <a:avLst/>
-          </a:prstGeom>
-          <a:noFill/>
-        </p:spPr>
-      </p:pic>
-      <p:pic>
-        <p:nvPicPr>
-          <p:cNvPr id="21" name="Picture 6"/>
-          <p:cNvPicPr>
-            <a:picLocks noChangeAspect="1" noChangeArrowheads="1"/>
-          </p:cNvPicPr>
-          <p:nvPr/>
-        </p:nvPicPr>
-        <p:blipFill>
-          <a:blip r:embed="rId13"/>
-          <a:srcRect/>
-          <a:stretch>
-            <a:fillRect/>
-          </a:stretch>
-        </p:blipFill>
-        <p:spPr bwMode="auto">
-          <a:xfrm>
-            <a:off x="6715140" y="2071678"/>
-            <a:ext cx="917575" cy="446088"/>
-          </a:xfrm>
-          <a:prstGeom prst="rect">
-            <a:avLst/>
-          </a:prstGeom>
-          <a:noFill/>
-          <a:ln w="9525">
-            <a:noFill/>
-            <a:round/>
-            <a:headEnd/>
-            <a:tailEnd/>
-          </a:ln>
-          <a:effectLst/>
-        </p:spPr>
-      </p:pic>
-      <p:pic>
-        <p:nvPicPr>
-          <p:cNvPr id="1030" name="Picture 6" descr="C:\Users\Андрей\Downloads\Liquibase Logo.png"/>
-          <p:cNvPicPr>
-            <a:picLocks noChangeAspect="1" noChangeArrowheads="1"/>
-          </p:cNvPicPr>
-          <p:nvPr/>
-        </p:nvPicPr>
-        <p:blipFill>
-          <a:blip r:embed="rId14"/>
-          <a:srcRect/>
-          <a:stretch>
-            <a:fillRect/>
-          </a:stretch>
-        </p:blipFill>
-        <p:spPr bwMode="auto">
-          <a:xfrm>
-            <a:off x="785786" y="3286124"/>
-            <a:ext cx="1927058" cy="360000"/>
+            <a:off x="71406" y="1469264"/>
+            <a:ext cx="9015600" cy="3960000"/>
           </a:xfrm>
           <a:prstGeom prst="rect">
             <a:avLst/>
@@ -4979,7 +4379,7 @@
       </p:grpSpPr>
       <p:sp>
         <p:nvSpPr>
-          <p:cNvPr id="2" name="Номер слайда 1"/>
+          <p:cNvPr id="5" name="Номер слайда 4"/>
           <p:cNvSpPr>
             <a:spLocks noGrp="1"/>
           </p:cNvSpPr>
@@ -4996,6 +4396,920 @@
               <a:rPr lang="ru-RU" smtClean="0"/>
               <a:pPr/>
               <a:t>16</a:t>
+            </a:fld>
+            <a:endParaRPr lang="ru-RU"/>
+          </a:p>
+        </p:txBody>
+      </p:sp>
+      <p:pic>
+        <p:nvPicPr>
+          <p:cNvPr id="1026" name="Picture 2" descr="C:\repo\project-jastt\presentation\source\report(pdf).png"/>
+          <p:cNvPicPr>
+            <a:picLocks noChangeAspect="1" noChangeArrowheads="1"/>
+          </p:cNvPicPr>
+          <p:nvPr/>
+        </p:nvPicPr>
+        <p:blipFill>
+          <a:blip r:embed="rId2"/>
+          <a:srcRect/>
+          <a:stretch>
+            <a:fillRect/>
+          </a:stretch>
+        </p:blipFill>
+        <p:spPr bwMode="auto">
+          <a:xfrm>
+            <a:off x="214282" y="1571612"/>
+            <a:ext cx="8713340" cy="4320000"/>
+          </a:xfrm>
+          <a:prstGeom prst="rect">
+            <a:avLst/>
+          </a:prstGeom>
+          <a:noFill/>
+        </p:spPr>
+      </p:pic>
+    </p:spTree>
+  </p:cSld>
+  <p:clrMapOvr>
+    <a:masterClrMapping/>
+  </p:clrMapOvr>
+</p:sld>
+</file>
+
+<file path=ppt/slides/slide17.xml><?xml version="1.0" encoding="utf-8"?>
+<p:sld xmlns:a="http://schemas.openxmlformats.org/drawingml/2006/main" xmlns:r="http://schemas.openxmlformats.org/officeDocument/2006/relationships" xmlns:p="http://schemas.openxmlformats.org/presentationml/2006/main">
+  <p:cSld>
+    <p:spTree>
+      <p:nvGrpSpPr>
+        <p:cNvPr id="1" name=""/>
+        <p:cNvGrpSpPr/>
+        <p:nvPr/>
+      </p:nvGrpSpPr>
+      <p:grpSpPr>
+        <a:xfrm>
+          <a:off x="0" y="0"/>
+          <a:ext cx="0" cy="0"/>
+          <a:chOff x="0" y="0"/>
+          <a:chExt cx="0" cy="0"/>
+        </a:xfrm>
+      </p:grpSpPr>
+      <p:sp>
+        <p:nvSpPr>
+          <p:cNvPr id="2" name="Заголовок 1"/>
+          <p:cNvSpPr>
+            <a:spLocks noGrp="1"/>
+          </p:cNvSpPr>
+          <p:nvPr>
+            <p:ph type="title"/>
+          </p:nvPr>
+        </p:nvSpPr>
+        <p:spPr/>
+        <p:txBody>
+          <a:bodyPr/>
+          <a:lstStyle/>
+          <a:p>
+            <a:endParaRPr lang="ru-RU"/>
+          </a:p>
+        </p:txBody>
+      </p:sp>
+      <p:sp>
+        <p:nvSpPr>
+          <p:cNvPr id="4" name="Нижний колонтитул 3"/>
+          <p:cNvSpPr>
+            <a:spLocks noGrp="1"/>
+          </p:cNvSpPr>
+          <p:nvPr>
+            <p:ph type="ftr" sz="quarter" idx="11"/>
+          </p:nvPr>
+        </p:nvSpPr>
+        <p:spPr/>
+        <p:txBody>
+          <a:bodyPr/>
+          <a:lstStyle/>
+          <a:p>
+            <a:endParaRPr lang="ru-RU"/>
+          </a:p>
+        </p:txBody>
+      </p:sp>
+      <p:sp>
+        <p:nvSpPr>
+          <p:cNvPr id="5" name="Номер слайда 4"/>
+          <p:cNvSpPr>
+            <a:spLocks noGrp="1"/>
+          </p:cNvSpPr>
+          <p:nvPr>
+            <p:ph type="sldNum" sz="quarter" idx="12"/>
+          </p:nvPr>
+        </p:nvSpPr>
+        <p:spPr/>
+        <p:txBody>
+          <a:bodyPr/>
+          <a:lstStyle/>
+          <a:p>
+            <a:fld id="{11D68980-9ECF-4181-A23B-CB36B8F9F50A}" type="slidenum">
+              <a:rPr lang="ru-RU" smtClean="0"/>
+              <a:pPr/>
+              <a:t>17</a:t>
+            </a:fld>
+            <a:endParaRPr lang="ru-RU"/>
+          </a:p>
+        </p:txBody>
+      </p:sp>
+      <p:pic>
+        <p:nvPicPr>
+          <p:cNvPr id="5122" name="Picture 2" descr="C:\repo\project-jastt\presentation\source\admin_page.png"/>
+          <p:cNvPicPr>
+            <a:picLocks noGrp="1" noChangeAspect="1" noChangeArrowheads="1"/>
+          </p:cNvPicPr>
+          <p:nvPr>
+            <p:ph idx="1"/>
+          </p:nvPr>
+        </p:nvPicPr>
+        <p:blipFill>
+          <a:blip r:embed="rId2"/>
+          <a:srcRect/>
+          <a:stretch>
+            <a:fillRect/>
+          </a:stretch>
+        </p:blipFill>
+        <p:spPr bwMode="auto">
+          <a:xfrm>
+            <a:off x="285720" y="2071678"/>
+            <a:ext cx="8605801" cy="3780000"/>
+          </a:xfrm>
+          <a:prstGeom prst="rect">
+            <a:avLst/>
+          </a:prstGeom>
+          <a:noFill/>
+        </p:spPr>
+      </p:pic>
+    </p:spTree>
+  </p:cSld>
+  <p:clrMapOvr>
+    <a:masterClrMapping/>
+  </p:clrMapOvr>
+</p:sld>
+</file>
+
+<file path=ppt/slides/slide18.xml><?xml version="1.0" encoding="utf-8"?>
+<p:sld xmlns:a="http://schemas.openxmlformats.org/drawingml/2006/main" xmlns:r="http://schemas.openxmlformats.org/officeDocument/2006/relationships" xmlns:p="http://schemas.openxmlformats.org/presentationml/2006/main">
+  <p:cSld>
+    <p:spTree>
+      <p:nvGrpSpPr>
+        <p:cNvPr id="1" name=""/>
+        <p:cNvGrpSpPr/>
+        <p:nvPr/>
+      </p:nvGrpSpPr>
+      <p:grpSpPr>
+        <a:xfrm>
+          <a:off x="0" y="0"/>
+          <a:ext cx="0" cy="0"/>
+          <a:chOff x="0" y="0"/>
+          <a:chExt cx="0" cy="0"/>
+        </a:xfrm>
+      </p:grpSpPr>
+      <p:sp>
+        <p:nvSpPr>
+          <p:cNvPr id="4" name="Заголовок 3"/>
+          <p:cNvSpPr>
+            <a:spLocks noGrp="1"/>
+          </p:cNvSpPr>
+          <p:nvPr>
+            <p:ph type="ctrTitle"/>
+          </p:nvPr>
+        </p:nvSpPr>
+        <p:spPr>
+          <a:xfrm>
+            <a:off x="642910" y="928670"/>
+            <a:ext cx="7772400" cy="928694"/>
+          </a:xfrm>
+          <a:noFill/>
+        </p:spPr>
+        <p:txBody>
+          <a:bodyPr>
+            <a:normAutofit/>
+          </a:bodyPr>
+          <a:lstStyle/>
+          <a:p>
+            <a:r>
+              <a:rPr lang="ru-RU" sz="3600" dirty="0" smtClean="0">
+                <a:solidFill>
+                  <a:schemeClr val="tx2">
+                    <a:lumMod val="75000"/>
+                  </a:schemeClr>
+                </a:solidFill>
+                <a:latin typeface="Verdana" pitchFamily="34" charset="0"/>
+              </a:rPr>
+              <a:t>Используемые технологии</a:t>
+            </a:r>
+            <a:endParaRPr lang="ru-RU" sz="3600" dirty="0">
+              <a:solidFill>
+                <a:schemeClr val="tx2">
+                  <a:lumMod val="75000"/>
+                </a:schemeClr>
+              </a:solidFill>
+              <a:latin typeface="Verdana" pitchFamily="34" charset="0"/>
+            </a:endParaRPr>
+          </a:p>
+        </p:txBody>
+      </p:sp>
+      <p:sp>
+        <p:nvSpPr>
+          <p:cNvPr id="5" name="Заголовок 2"/>
+          <p:cNvSpPr txBox="1">
+            <a:spLocks/>
+          </p:cNvSpPr>
+          <p:nvPr/>
+        </p:nvSpPr>
+        <p:spPr>
+          <a:xfrm>
+            <a:off x="457200" y="338328"/>
+            <a:ext cx="8229600" cy="1252728"/>
+          </a:xfrm>
+          <a:prstGeom prst="rect">
+            <a:avLst/>
+          </a:prstGeom>
+        </p:spPr>
+        <p:txBody>
+          <a:bodyPr vert="horz" lIns="91440" tIns="45720" rIns="91440" bIns="45720" rtlCol="0" anchor="ctr">
+            <a:normAutofit/>
+          </a:bodyPr>
+          <a:lstStyle/>
+          <a:p>
+            <a:pPr marL="0" marR="0" lvl="0" indent="0" algn="ctr" defTabSz="914400" rtl="0" eaLnBrk="1" fontAlgn="auto" latinLnBrk="0" hangingPunct="1">
+              <a:lnSpc>
+                <a:spcPct val="100000"/>
+              </a:lnSpc>
+              <a:spcBef>
+                <a:spcPct val="0"/>
+              </a:spcBef>
+              <a:spcAft>
+                <a:spcPts val="0"/>
+              </a:spcAft>
+              <a:buClrTx/>
+              <a:buSzTx/>
+              <a:buFontTx/>
+              <a:buNone/>
+              <a:tabLst/>
+              <a:defRPr/>
+            </a:pPr>
+            <a:endParaRPr kumimoji="0" lang="ru-RU" sz="4400" b="0" i="0" u="none" strike="noStrike" kern="1200" cap="none" spc="0" normalizeH="0" baseline="0" noProof="0" dirty="0">
+              <a:ln>
+                <a:noFill/>
+              </a:ln>
+              <a:solidFill>
+                <a:schemeClr val="tx1"/>
+              </a:solidFill>
+              <a:effectLst/>
+              <a:uLnTx/>
+              <a:uFillTx/>
+              <a:latin typeface="+mj-lt"/>
+              <a:ea typeface="+mj-ea"/>
+              <a:cs typeface="+mj-cs"/>
+            </a:endParaRPr>
+          </a:p>
+        </p:txBody>
+      </p:sp>
+      <p:pic>
+        <p:nvPicPr>
+          <p:cNvPr id="6" name="Picture 3"/>
+          <p:cNvPicPr>
+            <a:picLocks noChangeAspect="1" noChangeArrowheads="1"/>
+          </p:cNvPicPr>
+          <p:nvPr/>
+        </p:nvPicPr>
+        <p:blipFill>
+          <a:blip r:embed="rId2" cstate="print">
+            <a:extLst>
+              <a:ext uri="{28A0092B-C50C-407E-A947-70E740481C1C}">
+                <a14:useLocalDpi xmlns="" xmlns:a14="http://schemas.microsoft.com/office/drawing/2010/main" val="0"/>
+              </a:ext>
+            </a:extLst>
+          </a:blip>
+          <a:srcRect/>
+          <a:stretch>
+            <a:fillRect/>
+          </a:stretch>
+        </p:blipFill>
+        <p:spPr bwMode="auto">
+          <a:xfrm>
+            <a:off x="1643042" y="5429264"/>
+            <a:ext cx="1903413" cy="436563"/>
+          </a:xfrm>
+          <a:prstGeom prst="rect">
+            <a:avLst/>
+          </a:prstGeom>
+          <a:noFill/>
+          <a:ln>
+            <a:noFill/>
+          </a:ln>
+          <a:effectLst/>
+          <a:extLst>
+            <a:ext uri="{909E8E84-426E-40DD-AFC4-6F175D3DCCD1}">
+              <a14:hiddenFill xmlns="" xmlns:a14="http://schemas.microsoft.com/office/drawing/2010/main">
+                <a:blipFill dpi="0" rotWithShape="0">
+                  <a:blip/>
+                  <a:srcRect/>
+                  <a:stretch>
+                    <a:fillRect/>
+                  </a:stretch>
+                </a:blipFill>
+              </a14:hiddenFill>
+            </a:ext>
+            <a:ext uri="{91240B29-F687-4F45-9708-019B960494DF}">
+              <a14:hiddenLine xmlns="" xmlns:a14="http://schemas.microsoft.com/office/drawing/2010/main" w="9525">
+                <a:solidFill>
+                  <a:srgbClr val="808080"/>
+                </a:solidFill>
+                <a:round/>
+                <a:headEnd/>
+                <a:tailEnd/>
+              </a14:hiddenLine>
+            </a:ext>
+            <a:ext uri="{AF507438-7753-43E0-B8FC-AC1667EBCBE1}">
+              <a14:hiddenEffects xmlns="" xmlns:a14="http://schemas.microsoft.com/office/drawing/2010/main">
+                <a:effectLst>
+                  <a:outerShdw dist="35921" dir="2700000" algn="ctr" rotWithShape="0">
+                    <a:srgbClr val="808080"/>
+                  </a:outerShdw>
+                </a:effectLst>
+              </a14:hiddenEffects>
+            </a:ext>
+          </a:extLst>
+        </p:spPr>
+      </p:pic>
+      <p:pic>
+        <p:nvPicPr>
+          <p:cNvPr id="10" name="Picture 5"/>
+          <p:cNvPicPr>
+            <a:picLocks noChangeAspect="1" noChangeArrowheads="1"/>
+          </p:cNvPicPr>
+          <p:nvPr/>
+        </p:nvPicPr>
+        <p:blipFill>
+          <a:blip r:embed="rId3" cstate="print">
+            <a:extLst>
+              <a:ext uri="{28A0092B-C50C-407E-A947-70E740481C1C}">
+                <a14:useLocalDpi xmlns="" xmlns:a14="http://schemas.microsoft.com/office/drawing/2010/main" val="0"/>
+              </a:ext>
+            </a:extLst>
+          </a:blip>
+          <a:srcRect/>
+          <a:stretch>
+            <a:fillRect/>
+          </a:stretch>
+        </p:blipFill>
+        <p:spPr bwMode="auto">
+          <a:xfrm>
+            <a:off x="1928794" y="4500570"/>
+            <a:ext cx="1136650" cy="763588"/>
+          </a:xfrm>
+          <a:prstGeom prst="rect">
+            <a:avLst/>
+          </a:prstGeom>
+          <a:noFill/>
+          <a:ln>
+            <a:noFill/>
+          </a:ln>
+          <a:effectLst/>
+          <a:extLst>
+            <a:ext uri="{909E8E84-426E-40DD-AFC4-6F175D3DCCD1}">
+              <a14:hiddenFill xmlns="" xmlns:a14="http://schemas.microsoft.com/office/drawing/2010/main">
+                <a:blipFill dpi="0" rotWithShape="0">
+                  <a:blip/>
+                  <a:srcRect/>
+                  <a:stretch>
+                    <a:fillRect/>
+                  </a:stretch>
+                </a:blipFill>
+              </a14:hiddenFill>
+            </a:ext>
+            <a:ext uri="{91240B29-F687-4F45-9708-019B960494DF}">
+              <a14:hiddenLine xmlns="" xmlns:a14="http://schemas.microsoft.com/office/drawing/2010/main" w="9525">
+                <a:solidFill>
+                  <a:srgbClr val="808080"/>
+                </a:solidFill>
+                <a:round/>
+                <a:headEnd/>
+                <a:tailEnd/>
+              </a14:hiddenLine>
+            </a:ext>
+            <a:ext uri="{AF507438-7753-43E0-B8FC-AC1667EBCBE1}">
+              <a14:hiddenEffects xmlns="" xmlns:a14="http://schemas.microsoft.com/office/drawing/2010/main">
+                <a:effectLst>
+                  <a:outerShdw dist="35921" dir="2700000" algn="ctr" rotWithShape="0">
+                    <a:srgbClr val="808080"/>
+                  </a:outerShdw>
+                </a:effectLst>
+              </a14:hiddenEffects>
+            </a:ext>
+          </a:extLst>
+        </p:spPr>
+      </p:pic>
+      <p:pic>
+        <p:nvPicPr>
+          <p:cNvPr id="11" name="Picture 15"/>
+          <p:cNvPicPr>
+            <a:picLocks noChangeAspect="1" noChangeArrowheads="1"/>
+          </p:cNvPicPr>
+          <p:nvPr/>
+        </p:nvPicPr>
+        <p:blipFill>
+          <a:blip r:embed="rId4" cstate="print">
+            <a:extLst>
+              <a:ext uri="{28A0092B-C50C-407E-A947-70E740481C1C}">
+                <a14:useLocalDpi xmlns="" xmlns:a14="http://schemas.microsoft.com/office/drawing/2010/main" val="0"/>
+              </a:ext>
+            </a:extLst>
+          </a:blip>
+          <a:srcRect/>
+          <a:stretch>
+            <a:fillRect/>
+          </a:stretch>
+        </p:blipFill>
+        <p:spPr bwMode="auto">
+          <a:xfrm>
+            <a:off x="6072198" y="4786322"/>
+            <a:ext cx="2395537" cy="442913"/>
+          </a:xfrm>
+          <a:prstGeom prst="rect">
+            <a:avLst/>
+          </a:prstGeom>
+          <a:noFill/>
+          <a:ln>
+            <a:noFill/>
+          </a:ln>
+          <a:effectLst/>
+          <a:extLst>
+            <a:ext uri="{909E8E84-426E-40DD-AFC4-6F175D3DCCD1}">
+              <a14:hiddenFill xmlns="" xmlns:a14="http://schemas.microsoft.com/office/drawing/2010/main">
+                <a:blipFill dpi="0" rotWithShape="0">
+                  <a:blip/>
+                  <a:srcRect/>
+                  <a:stretch>
+                    <a:fillRect/>
+                  </a:stretch>
+                </a:blipFill>
+              </a14:hiddenFill>
+            </a:ext>
+            <a:ext uri="{91240B29-F687-4F45-9708-019B960494DF}">
+              <a14:hiddenLine xmlns="" xmlns:a14="http://schemas.microsoft.com/office/drawing/2010/main" w="9525">
+                <a:solidFill>
+                  <a:srgbClr val="808080"/>
+                </a:solidFill>
+                <a:round/>
+                <a:headEnd/>
+                <a:tailEnd/>
+              </a14:hiddenLine>
+            </a:ext>
+            <a:ext uri="{AF507438-7753-43E0-B8FC-AC1667EBCBE1}">
+              <a14:hiddenEffects xmlns="" xmlns:a14="http://schemas.microsoft.com/office/drawing/2010/main">
+                <a:effectLst>
+                  <a:outerShdw dist="35921" dir="2700000" algn="ctr" rotWithShape="0">
+                    <a:srgbClr val="808080"/>
+                  </a:outerShdw>
+                </a:effectLst>
+              </a14:hiddenEffects>
+            </a:ext>
+          </a:extLst>
+        </p:spPr>
+      </p:pic>
+      <p:pic>
+        <p:nvPicPr>
+          <p:cNvPr id="13" name="Picture 4"/>
+          <p:cNvPicPr>
+            <a:picLocks noChangeAspect="1" noChangeArrowheads="1"/>
+          </p:cNvPicPr>
+          <p:nvPr/>
+        </p:nvPicPr>
+        <p:blipFill>
+          <a:blip r:embed="rId5" cstate="print">
+            <a:extLst>
+              <a:ext uri="{28A0092B-C50C-407E-A947-70E740481C1C}">
+                <a14:useLocalDpi xmlns="" xmlns:a14="http://schemas.microsoft.com/office/drawing/2010/main" val="0"/>
+              </a:ext>
+            </a:extLst>
+          </a:blip>
+          <a:srcRect/>
+          <a:stretch>
+            <a:fillRect/>
+          </a:stretch>
+        </p:blipFill>
+        <p:spPr bwMode="auto">
+          <a:xfrm>
+            <a:off x="6500826" y="2857496"/>
+            <a:ext cx="2049883" cy="720000"/>
+          </a:xfrm>
+          <a:prstGeom prst="rect">
+            <a:avLst/>
+          </a:prstGeom>
+          <a:noFill/>
+          <a:ln>
+            <a:noFill/>
+          </a:ln>
+          <a:extLst>
+            <a:ext uri="{909E8E84-426E-40DD-AFC4-6F175D3DCCD1}">
+              <a14:hiddenFill xmlns="" xmlns:a14="http://schemas.microsoft.com/office/drawing/2010/main">
+                <a:solidFill>
+                  <a:schemeClr val="accent1"/>
+                </a:solidFill>
+              </a14:hiddenFill>
+            </a:ext>
+            <a:ext uri="{91240B29-F687-4F45-9708-019B960494DF}">
+              <a14:hiddenLine xmlns="" xmlns:a14="http://schemas.microsoft.com/office/drawing/2010/main" w="9525">
+                <a:solidFill>
+                  <a:schemeClr val="tx1"/>
+                </a:solidFill>
+                <a:miter lim="800000"/>
+                <a:headEnd/>
+                <a:tailEnd/>
+              </a14:hiddenLine>
+            </a:ext>
+          </a:extLst>
+        </p:spPr>
+      </p:pic>
+      <p:pic>
+        <p:nvPicPr>
+          <p:cNvPr id="14" name="Picture 14"/>
+          <p:cNvPicPr>
+            <a:picLocks noChangeAspect="1" noChangeArrowheads="1"/>
+          </p:cNvPicPr>
+          <p:nvPr/>
+        </p:nvPicPr>
+        <p:blipFill>
+          <a:blip r:embed="rId6" cstate="print">
+            <a:extLst>
+              <a:ext uri="{28A0092B-C50C-407E-A947-70E740481C1C}">
+                <a14:useLocalDpi xmlns="" xmlns:a14="http://schemas.microsoft.com/office/drawing/2010/main" val="0"/>
+              </a:ext>
+            </a:extLst>
+          </a:blip>
+          <a:srcRect/>
+          <a:stretch>
+            <a:fillRect/>
+          </a:stretch>
+        </p:blipFill>
+        <p:spPr bwMode="auto">
+          <a:xfrm>
+            <a:off x="714348" y="2428868"/>
+            <a:ext cx="2370137" cy="741362"/>
+          </a:xfrm>
+          <a:prstGeom prst="rect">
+            <a:avLst/>
+          </a:prstGeom>
+          <a:noFill/>
+          <a:ln>
+            <a:noFill/>
+          </a:ln>
+          <a:effectLst/>
+          <a:extLst>
+            <a:ext uri="{909E8E84-426E-40DD-AFC4-6F175D3DCCD1}">
+              <a14:hiddenFill xmlns="" xmlns:a14="http://schemas.microsoft.com/office/drawing/2010/main">
+                <a:blipFill dpi="0" rotWithShape="0">
+                  <a:blip/>
+                  <a:srcRect/>
+                  <a:stretch>
+                    <a:fillRect/>
+                  </a:stretch>
+                </a:blipFill>
+              </a14:hiddenFill>
+            </a:ext>
+            <a:ext uri="{91240B29-F687-4F45-9708-019B960494DF}">
+              <a14:hiddenLine xmlns="" xmlns:a14="http://schemas.microsoft.com/office/drawing/2010/main" w="9525">
+                <a:solidFill>
+                  <a:srgbClr val="808080"/>
+                </a:solidFill>
+                <a:round/>
+                <a:headEnd/>
+                <a:tailEnd/>
+              </a14:hiddenLine>
+            </a:ext>
+            <a:ext uri="{AF507438-7753-43E0-B8FC-AC1667EBCBE1}">
+              <a14:hiddenEffects xmlns="" xmlns:a14="http://schemas.microsoft.com/office/drawing/2010/main">
+                <a:effectLst>
+                  <a:outerShdw dist="35921" dir="2700000" algn="ctr" rotWithShape="0">
+                    <a:srgbClr val="808080"/>
+                  </a:outerShdw>
+                </a:effectLst>
+              </a14:hiddenEffects>
+            </a:ext>
+          </a:extLst>
+        </p:spPr>
+      </p:pic>
+      <p:pic>
+        <p:nvPicPr>
+          <p:cNvPr id="16" name="Picture 13"/>
+          <p:cNvPicPr>
+            <a:picLocks noChangeAspect="1" noChangeArrowheads="1"/>
+          </p:cNvPicPr>
+          <p:nvPr/>
+        </p:nvPicPr>
+        <p:blipFill>
+          <a:blip r:embed="rId7" cstate="print">
+            <a:extLst>
+              <a:ext uri="{28A0092B-C50C-407E-A947-70E740481C1C}">
+                <a14:useLocalDpi xmlns="" xmlns:a14="http://schemas.microsoft.com/office/drawing/2010/main" val="0"/>
+              </a:ext>
+            </a:extLst>
+          </a:blip>
+          <a:srcRect/>
+          <a:stretch>
+            <a:fillRect/>
+          </a:stretch>
+        </p:blipFill>
+        <p:spPr bwMode="auto">
+          <a:xfrm>
+            <a:off x="1428728" y="3929066"/>
+            <a:ext cx="1663945" cy="360000"/>
+          </a:xfrm>
+          <a:prstGeom prst="rect">
+            <a:avLst/>
+          </a:prstGeom>
+          <a:noFill/>
+          <a:ln>
+            <a:noFill/>
+          </a:ln>
+          <a:effectLst/>
+          <a:extLst>
+            <a:ext uri="{909E8E84-426E-40DD-AFC4-6F175D3DCCD1}">
+              <a14:hiddenFill xmlns="" xmlns:a14="http://schemas.microsoft.com/office/drawing/2010/main">
+                <a:blipFill dpi="0" rotWithShape="0">
+                  <a:blip/>
+                  <a:srcRect/>
+                  <a:stretch>
+                    <a:fillRect/>
+                  </a:stretch>
+                </a:blipFill>
+              </a14:hiddenFill>
+            </a:ext>
+            <a:ext uri="{91240B29-F687-4F45-9708-019B960494DF}">
+              <a14:hiddenLine xmlns="" xmlns:a14="http://schemas.microsoft.com/office/drawing/2010/main" w="9525">
+                <a:solidFill>
+                  <a:srgbClr val="808080"/>
+                </a:solidFill>
+                <a:round/>
+                <a:headEnd/>
+                <a:tailEnd/>
+              </a14:hiddenLine>
+            </a:ext>
+            <a:ext uri="{AF507438-7753-43E0-B8FC-AC1667EBCBE1}">
+              <a14:hiddenEffects xmlns="" xmlns:a14="http://schemas.microsoft.com/office/drawing/2010/main">
+                <a:effectLst>
+                  <a:outerShdw dist="35921" dir="2700000" algn="ctr" rotWithShape="0">
+                    <a:srgbClr val="808080"/>
+                  </a:outerShdw>
+                </a:effectLst>
+              </a14:hiddenEffects>
+            </a:ext>
+          </a:extLst>
+        </p:spPr>
+      </p:pic>
+      <p:pic>
+        <p:nvPicPr>
+          <p:cNvPr id="19" name="Picture 7"/>
+          <p:cNvPicPr>
+            <a:picLocks noChangeAspect="1" noChangeArrowheads="1"/>
+          </p:cNvPicPr>
+          <p:nvPr/>
+        </p:nvPicPr>
+        <p:blipFill>
+          <a:blip r:embed="rId8"/>
+          <a:srcRect/>
+          <a:stretch>
+            <a:fillRect/>
+          </a:stretch>
+        </p:blipFill>
+        <p:spPr bwMode="auto">
+          <a:xfrm>
+            <a:off x="6643702" y="3929066"/>
+            <a:ext cx="1703387" cy="436563"/>
+          </a:xfrm>
+          <a:prstGeom prst="rect">
+            <a:avLst/>
+          </a:prstGeom>
+          <a:noFill/>
+          <a:ln w="9525">
+            <a:noFill/>
+            <a:round/>
+            <a:headEnd/>
+            <a:tailEnd/>
+          </a:ln>
+          <a:effectLst/>
+        </p:spPr>
+      </p:pic>
+      <p:pic>
+        <p:nvPicPr>
+          <p:cNvPr id="1026" name="Picture 2" descr="C:\Users\Андрей\Downloads\jaspersoft-jasperreports-logo.jpg"/>
+          <p:cNvPicPr>
+            <a:picLocks noChangeAspect="1" noChangeArrowheads="1"/>
+          </p:cNvPicPr>
+          <p:nvPr/>
+        </p:nvPicPr>
+        <p:blipFill>
+          <a:blip r:embed="rId9"/>
+          <a:srcRect t="41809" b="41809"/>
+          <a:stretch>
+            <a:fillRect/>
+          </a:stretch>
+        </p:blipFill>
+        <p:spPr bwMode="auto">
+          <a:xfrm>
+            <a:off x="3571868" y="5357826"/>
+            <a:ext cx="3296650" cy="540000"/>
+          </a:xfrm>
+          <a:prstGeom prst="rect">
+            <a:avLst/>
+          </a:prstGeom>
+          <a:noFill/>
+        </p:spPr>
+      </p:pic>
+      <p:pic>
+        <p:nvPicPr>
+          <p:cNvPr id="1027" name="Picture 3" descr="C:\Users\Андрей\Downloads\Tomcat 7.png"/>
+          <p:cNvPicPr>
+            <a:picLocks noChangeAspect="1" noChangeArrowheads="1"/>
+          </p:cNvPicPr>
+          <p:nvPr/>
+        </p:nvPicPr>
+        <p:blipFill>
+          <a:blip r:embed="rId10"/>
+          <a:srcRect/>
+          <a:stretch>
+            <a:fillRect/>
+          </a:stretch>
+        </p:blipFill>
+        <p:spPr bwMode="auto">
+          <a:xfrm>
+            <a:off x="4572000" y="1714488"/>
+            <a:ext cx="1800000" cy="900000"/>
+          </a:xfrm>
+          <a:prstGeom prst="rect">
+            <a:avLst/>
+          </a:prstGeom>
+          <a:noFill/>
+        </p:spPr>
+      </p:pic>
+      <p:pic>
+        <p:nvPicPr>
+          <p:cNvPr id="1028" name="Picture 4" descr="C:\Users\Андрей\Downloads\java-logo.png"/>
+          <p:cNvPicPr>
+            <a:picLocks noChangeAspect="1" noChangeArrowheads="1"/>
+          </p:cNvPicPr>
+          <p:nvPr/>
+        </p:nvPicPr>
+        <p:blipFill>
+          <a:blip r:embed="rId11"/>
+          <a:srcRect l="16798" t="8399" r="16798" b="8399"/>
+          <a:stretch>
+            <a:fillRect/>
+          </a:stretch>
+        </p:blipFill>
+        <p:spPr bwMode="auto">
+          <a:xfrm>
+            <a:off x="4071934" y="3071810"/>
+            <a:ext cx="1147474" cy="1437726"/>
+          </a:xfrm>
+          <a:prstGeom prst="rect">
+            <a:avLst/>
+          </a:prstGeom>
+          <a:noFill/>
+        </p:spPr>
+      </p:pic>
+      <p:pic>
+        <p:nvPicPr>
+          <p:cNvPr id="1029" name="Picture 5" descr="C:\Users\Андрей\Downloads\Spring Logo2.png"/>
+          <p:cNvPicPr>
+            <a:picLocks noChangeAspect="1" noChangeArrowheads="1"/>
+          </p:cNvPicPr>
+          <p:nvPr/>
+        </p:nvPicPr>
+        <p:blipFill>
+          <a:blip r:embed="rId12"/>
+          <a:srcRect l="13760" t="9294" r="13760" b="9294"/>
+          <a:stretch>
+            <a:fillRect/>
+          </a:stretch>
+        </p:blipFill>
+        <p:spPr bwMode="auto">
+          <a:xfrm>
+            <a:off x="2786050" y="1857364"/>
+            <a:ext cx="1623473" cy="540000"/>
+          </a:xfrm>
+          <a:prstGeom prst="rect">
+            <a:avLst/>
+          </a:prstGeom>
+          <a:noFill/>
+        </p:spPr>
+      </p:pic>
+      <p:pic>
+        <p:nvPicPr>
+          <p:cNvPr id="21" name="Picture 6"/>
+          <p:cNvPicPr>
+            <a:picLocks noChangeAspect="1" noChangeArrowheads="1"/>
+          </p:cNvPicPr>
+          <p:nvPr/>
+        </p:nvPicPr>
+        <p:blipFill>
+          <a:blip r:embed="rId13"/>
+          <a:srcRect/>
+          <a:stretch>
+            <a:fillRect/>
+          </a:stretch>
+        </p:blipFill>
+        <p:spPr bwMode="auto">
+          <a:xfrm>
+            <a:off x="6715140" y="2071678"/>
+            <a:ext cx="917575" cy="446088"/>
+          </a:xfrm>
+          <a:prstGeom prst="rect">
+            <a:avLst/>
+          </a:prstGeom>
+          <a:noFill/>
+          <a:ln w="9525">
+            <a:noFill/>
+            <a:round/>
+            <a:headEnd/>
+            <a:tailEnd/>
+          </a:ln>
+          <a:effectLst/>
+        </p:spPr>
+      </p:pic>
+      <p:pic>
+        <p:nvPicPr>
+          <p:cNvPr id="1030" name="Picture 6" descr="C:\Users\Андрей\Downloads\Liquibase Logo.png"/>
+          <p:cNvPicPr>
+            <a:picLocks noChangeAspect="1" noChangeArrowheads="1"/>
+          </p:cNvPicPr>
+          <p:nvPr/>
+        </p:nvPicPr>
+        <p:blipFill>
+          <a:blip r:embed="rId14"/>
+          <a:srcRect/>
+          <a:stretch>
+            <a:fillRect/>
+          </a:stretch>
+        </p:blipFill>
+        <p:spPr bwMode="auto">
+          <a:xfrm>
+            <a:off x="785786" y="3286124"/>
+            <a:ext cx="1927058" cy="360000"/>
+          </a:xfrm>
+          <a:prstGeom prst="rect">
+            <a:avLst/>
+          </a:prstGeom>
+          <a:noFill/>
+        </p:spPr>
+      </p:pic>
+    </p:spTree>
+  </p:cSld>
+  <p:clrMapOvr>
+    <a:masterClrMapping/>
+  </p:clrMapOvr>
+  <p:timing>
+    <p:tnLst>
+      <p:par>
+        <p:cTn id="1" dur="indefinite" restart="never" nodeType="tmRoot"/>
+      </p:par>
+    </p:tnLst>
+  </p:timing>
+</p:sld>
+</file>
+
+<file path=ppt/slides/slide19.xml><?xml version="1.0" encoding="utf-8"?>
+<p:sld xmlns:a="http://schemas.openxmlformats.org/drawingml/2006/main" xmlns:r="http://schemas.openxmlformats.org/officeDocument/2006/relationships" xmlns:p="http://schemas.openxmlformats.org/presentationml/2006/main">
+  <p:cSld>
+    <p:spTree>
+      <p:nvGrpSpPr>
+        <p:cNvPr id="1" name=""/>
+        <p:cNvGrpSpPr/>
+        <p:nvPr/>
+      </p:nvGrpSpPr>
+      <p:grpSpPr>
+        <a:xfrm>
+          <a:off x="0" y="0"/>
+          <a:ext cx="0" cy="0"/>
+          <a:chOff x="0" y="0"/>
+          <a:chExt cx="0" cy="0"/>
+        </a:xfrm>
+      </p:grpSpPr>
+      <p:sp>
+        <p:nvSpPr>
+          <p:cNvPr id="2" name="Номер слайда 1"/>
+          <p:cNvSpPr>
+            <a:spLocks noGrp="1"/>
+          </p:cNvSpPr>
+          <p:nvPr>
+            <p:ph type="sldNum" sz="quarter" idx="12"/>
+          </p:nvPr>
+        </p:nvSpPr>
+        <p:spPr/>
+        <p:txBody>
+          <a:bodyPr/>
+          <a:lstStyle/>
+          <a:p>
+            <a:fld id="{11D68980-9ECF-4181-A23B-CB36B8F9F50A}" type="slidenum">
+              <a:rPr lang="ru-RU" smtClean="0"/>
+              <a:pPr/>
+              <a:t>19</a:t>
             </a:fld>
             <a:endParaRPr lang="ru-RU"/>
           </a:p>
@@ -5212,7 +5526,7 @@
         </p:nvSpPr>
         <p:spPr>
           <a:xfrm>
-            <a:off x="642910" y="1785926"/>
+            <a:off x="500034" y="1928802"/>
             <a:ext cx="8072494" cy="4572032"/>
           </a:xfrm>
         </p:spPr>
@@ -5222,7 +5536,7 @@
           </a:bodyPr>
           <a:lstStyle/>
           <a:p>
-            <a:pPr marL="457200" indent="-457200" algn="l" fontAlgn="base">
+            <a:pPr marL="457200" indent="-457200" algn="just" fontAlgn="base">
               <a:buFont typeface="+mj-lt"/>
               <a:buAutoNum type="arabicPeriod"/>
             </a:pPr>
@@ -5283,7 +5597,7 @@
             </a:r>
           </a:p>
           <a:p>
-            <a:pPr marL="457200" indent="-457200" algn="l" fontAlgn="base">
+            <a:pPr marL="457200" indent="-457200" algn="just" fontAlgn="base">
               <a:buFont typeface="+mj-lt"/>
               <a:buAutoNum type="arabicPeriod"/>
             </a:pPr>
@@ -5300,7 +5614,7 @@
             </a:r>
           </a:p>
           <a:p>
-            <a:pPr marL="457200" indent="-457200" algn="l" fontAlgn="base">
+            <a:pPr marL="457200" indent="-457200" algn="just" fontAlgn="base">
               <a:buFont typeface="+mj-lt"/>
               <a:buAutoNum type="arabicPeriod"/>
             </a:pPr>
@@ -5317,7 +5631,7 @@
             </a:r>
           </a:p>
           <a:p>
-            <a:pPr marL="457200" indent="-457200" algn="l" fontAlgn="base">
+            <a:pPr marL="457200" indent="-457200" algn="just" fontAlgn="base">
               <a:buFont typeface="+mj-lt"/>
               <a:buAutoNum type="arabicPeriod"/>
             </a:pPr>
@@ -5335,6 +5649,7 @@
             <a:endParaRPr lang="ru-RU" sz="2400" dirty="0" smtClean="0"/>
           </a:p>
           <a:p>
+            <a:pPr algn="just"/>
             <a:endParaRPr lang="ru-RU" sz="2400" dirty="0"/>
           </a:p>
         </p:txBody>
@@ -5351,6 +5666,191 @@
       </p:par>
     </p:tnLst>
   </p:timing>
+</p:sld>
+</file>
+
+<file path=ppt/slides/slide20.xml><?xml version="1.0" encoding="utf-8"?>
+<p:sld xmlns:a="http://schemas.openxmlformats.org/drawingml/2006/main" xmlns:r="http://schemas.openxmlformats.org/officeDocument/2006/relationships" xmlns:p="http://schemas.openxmlformats.org/presentationml/2006/main">
+  <p:cSld>
+    <p:spTree>
+      <p:nvGrpSpPr>
+        <p:cNvPr id="1" name=""/>
+        <p:cNvGrpSpPr/>
+        <p:nvPr/>
+      </p:nvGrpSpPr>
+      <p:grpSpPr>
+        <a:xfrm>
+          <a:off x="0" y="0"/>
+          <a:ext cx="0" cy="0"/>
+          <a:chOff x="0" y="0"/>
+          <a:chExt cx="0" cy="0"/>
+        </a:xfrm>
+      </p:grpSpPr>
+      <p:sp>
+        <p:nvSpPr>
+          <p:cNvPr id="5" name="Номер слайда 4"/>
+          <p:cNvSpPr>
+            <a:spLocks noGrp="1"/>
+          </p:cNvSpPr>
+          <p:nvPr>
+            <p:ph type="sldNum" sz="quarter" idx="12"/>
+          </p:nvPr>
+        </p:nvSpPr>
+        <p:spPr/>
+        <p:txBody>
+          <a:bodyPr/>
+          <a:lstStyle/>
+          <a:p>
+            <a:fld id="{11D68980-9ECF-4181-A23B-CB36B8F9F50A}" type="slidenum">
+              <a:rPr lang="ru-RU" smtClean="0"/>
+              <a:pPr/>
+              <a:t>20</a:t>
+            </a:fld>
+            <a:endParaRPr lang="ru-RU"/>
+          </a:p>
+        </p:txBody>
+      </p:sp>
+      <p:pic>
+        <p:nvPicPr>
+          <p:cNvPr id="1028" name="Picture 4" descr="C:\repo\project-jastt\presentation\source\Trello Activity.png"/>
+          <p:cNvPicPr>
+            <a:picLocks noChangeAspect="1" noChangeArrowheads="1"/>
+          </p:cNvPicPr>
+          <p:nvPr/>
+        </p:nvPicPr>
+        <p:blipFill>
+          <a:blip r:embed="rId2"/>
+          <a:srcRect/>
+          <a:stretch>
+            <a:fillRect/>
+          </a:stretch>
+        </p:blipFill>
+        <p:spPr bwMode="auto">
+          <a:xfrm>
+            <a:off x="142844" y="1177892"/>
+            <a:ext cx="8775000" cy="4680000"/>
+          </a:xfrm>
+          <a:prstGeom prst="rect">
+            <a:avLst/>
+          </a:prstGeom>
+          <a:noFill/>
+        </p:spPr>
+      </p:pic>
+    </p:spTree>
+  </p:cSld>
+  <p:clrMapOvr>
+    <a:masterClrMapping/>
+  </p:clrMapOvr>
+</p:sld>
+</file>
+
+<file path=ppt/slides/slide21.xml><?xml version="1.0" encoding="utf-8"?>
+<p:sld xmlns:a="http://schemas.openxmlformats.org/drawingml/2006/main" xmlns:r="http://schemas.openxmlformats.org/officeDocument/2006/relationships" xmlns:p="http://schemas.openxmlformats.org/presentationml/2006/main">
+  <p:cSld>
+    <p:spTree>
+      <p:nvGrpSpPr>
+        <p:cNvPr id="1" name=""/>
+        <p:cNvGrpSpPr/>
+        <p:nvPr/>
+      </p:nvGrpSpPr>
+      <p:grpSpPr>
+        <a:xfrm>
+          <a:off x="0" y="0"/>
+          <a:ext cx="0" cy="0"/>
+          <a:chOff x="0" y="0"/>
+          <a:chExt cx="0" cy="0"/>
+        </a:xfrm>
+      </p:grpSpPr>
+      <p:sp>
+        <p:nvSpPr>
+          <p:cNvPr id="2" name="Заголовок 1"/>
+          <p:cNvSpPr>
+            <a:spLocks noGrp="1"/>
+          </p:cNvSpPr>
+          <p:nvPr>
+            <p:ph type="title"/>
+          </p:nvPr>
+        </p:nvSpPr>
+        <p:spPr>
+          <a:xfrm>
+            <a:off x="428596" y="857232"/>
+            <a:ext cx="8229600" cy="1143000"/>
+          </a:xfrm>
+        </p:spPr>
+        <p:txBody>
+          <a:bodyPr/>
+          <a:lstStyle/>
+          <a:p>
+            <a:r>
+              <a:rPr lang="ru-RU" dirty="0" smtClean="0"/>
+              <a:t>Спасибо за внимание!</a:t>
+            </a:r>
+            <a:endParaRPr lang="ru-RU" dirty="0"/>
+          </a:p>
+        </p:txBody>
+      </p:sp>
+      <p:sp>
+        <p:nvSpPr>
+          <p:cNvPr id="5" name="Номер слайда 4"/>
+          <p:cNvSpPr>
+            <a:spLocks noGrp="1"/>
+          </p:cNvSpPr>
+          <p:nvPr>
+            <p:ph type="sldNum" sz="quarter" idx="12"/>
+          </p:nvPr>
+        </p:nvSpPr>
+        <p:spPr/>
+        <p:txBody>
+          <a:bodyPr/>
+          <a:lstStyle/>
+          <a:p>
+            <a:fld id="{11D68980-9ECF-4181-A23B-CB36B8F9F50A}" type="slidenum">
+              <a:rPr lang="ru-RU" smtClean="0"/>
+              <a:pPr/>
+              <a:t>21</a:t>
+            </a:fld>
+            <a:endParaRPr lang="ru-RU"/>
+          </a:p>
+        </p:txBody>
+      </p:sp>
+      <p:pic>
+        <p:nvPicPr>
+          <p:cNvPr id="4100" name="Picture 4"/>
+          <p:cNvPicPr>
+            <a:picLocks noChangeAspect="1" noChangeArrowheads="1"/>
+          </p:cNvPicPr>
+          <p:nvPr/>
+        </p:nvPicPr>
+        <p:blipFill>
+          <a:blip r:embed="rId2"/>
+          <a:srcRect/>
+          <a:stretch>
+            <a:fillRect/>
+          </a:stretch>
+        </p:blipFill>
+        <p:spPr bwMode="auto">
+          <a:xfrm>
+            <a:off x="3643306" y="2857496"/>
+            <a:ext cx="2076450" cy="2200275"/>
+          </a:xfrm>
+          <a:prstGeom prst="rect">
+            <a:avLst/>
+          </a:prstGeom>
+          <a:noFill/>
+          <a:ln w="9525">
+            <a:noFill/>
+            <a:miter lim="800000"/>
+            <a:headEnd/>
+            <a:tailEnd/>
+          </a:ln>
+          <a:effectLst/>
+        </p:spPr>
+      </p:pic>
+    </p:spTree>
+  </p:cSld>
+  <p:clrMapOvr>
+    <a:masterClrMapping/>
+  </p:clrMapOvr>
 </p:sld>
 </file>
 
@@ -5426,7 +5926,7 @@
         </p:nvSpPr>
         <p:spPr>
           <a:xfrm>
-            <a:off x="642910" y="1785926"/>
+            <a:off x="642910" y="2000240"/>
             <a:ext cx="8072494" cy="4572032"/>
           </a:xfrm>
         </p:spPr>
@@ -5436,7 +5936,7 @@
           </a:bodyPr>
           <a:lstStyle/>
           <a:p>
-            <a:pPr marL="457200" indent="-457200" algn="l" fontAlgn="base">
+            <a:pPr marL="457200" indent="-457200" algn="just" fontAlgn="base">
               <a:buFont typeface="+mj-lt"/>
               <a:buAutoNum type="arabicPeriod"/>
             </a:pPr>
@@ -5461,7 +5961,7 @@
             </a:endParaRPr>
           </a:p>
           <a:p>
-            <a:pPr marL="457200" indent="-457200" algn="l" fontAlgn="base">
+            <a:pPr marL="457200" indent="-457200" algn="just" fontAlgn="base">
               <a:buFont typeface="+mj-lt"/>
               <a:buAutoNum type="arabicPeriod"/>
             </a:pPr>
@@ -5489,7 +5989,7 @@
             </a:r>
           </a:p>
           <a:p>
-            <a:pPr marL="457200" indent="-457200" algn="l" fontAlgn="base">
+            <a:pPr marL="457200" indent="-457200" algn="just" fontAlgn="base">
               <a:buFont typeface="+mj-lt"/>
               <a:buAutoNum type="arabicPeriod"/>
             </a:pPr>
@@ -5517,7 +6017,7 @@
             </a:r>
           </a:p>
           <a:p>
-            <a:pPr marL="457200" indent="-457200" algn="l" fontAlgn="base">
+            <a:pPr marL="457200" indent="-457200" algn="just" fontAlgn="base">
               <a:buFont typeface="+mj-lt"/>
               <a:buAutoNum type="arabicPeriod"/>
             </a:pPr>
@@ -5553,7 +6053,7 @@
             </a:endParaRPr>
           </a:p>
           <a:p>
-            <a:pPr marL="457200" indent="-457200" algn="l" fontAlgn="base">
+            <a:pPr marL="457200" indent="-457200" algn="just" fontAlgn="base">
               <a:buFont typeface="+mj-lt"/>
               <a:buAutoNum type="arabicPeriod"/>
             </a:pPr>
@@ -5570,7 +6070,7 @@
             </a:r>
           </a:p>
           <a:p>
-            <a:pPr marL="457200" indent="-457200" algn="l" fontAlgn="base">
+            <a:pPr marL="457200" indent="-457200" algn="just" fontAlgn="base">
               <a:buFont typeface="+mj-lt"/>
               <a:buAutoNum type="arabicPeriod"/>
             </a:pPr>
@@ -5587,13 +6087,14 @@
             </a:r>
           </a:p>
           <a:p>
-            <a:pPr marL="457200" indent="-457200" algn="l" fontAlgn="base">
+            <a:pPr marL="457200" indent="-457200" algn="just" fontAlgn="base">
               <a:buFont typeface="+mj-lt"/>
               <a:buAutoNum type="arabicPeriod"/>
             </a:pPr>
             <a:endParaRPr lang="ru-RU" sz="2400" dirty="0" smtClean="0"/>
           </a:p>
           <a:p>
+            <a:pPr algn="just"/>
             <a:endParaRPr lang="ru-RU" sz="2400" dirty="0"/>
           </a:p>
         </p:txBody>
@@ -5685,7 +6186,7 @@
         </p:nvSpPr>
         <p:spPr>
           <a:xfrm>
-            <a:off x="642910" y="1785926"/>
+            <a:off x="642910" y="2000240"/>
             <a:ext cx="8072494" cy="4572032"/>
           </a:xfrm>
         </p:spPr>
@@ -5695,7 +6196,7 @@
           </a:bodyPr>
           <a:lstStyle/>
           <a:p>
-            <a:pPr marL="457200" indent="-457200" algn="l" fontAlgn="base">
+            <a:pPr marL="457200" indent="-457200" algn="just" fontAlgn="base">
               <a:buFont typeface="+mj-lt"/>
               <a:buAutoNum type="arabicPeriod"/>
             </a:pPr>
@@ -5712,7 +6213,7 @@
             </a:r>
           </a:p>
           <a:p>
-            <a:pPr marL="457200" indent="-457200" algn="l" fontAlgn="base">
+            <a:pPr marL="457200" indent="-457200" algn="just" fontAlgn="base">
               <a:buFont typeface="+mj-lt"/>
               <a:buAutoNum type="arabicPeriod"/>
             </a:pPr>
@@ -5729,7 +6230,7 @@
             </a:r>
           </a:p>
           <a:p>
-            <a:pPr marL="457200" indent="-457200" algn="l" fontAlgn="base">
+            <a:pPr marL="457200" indent="-457200" algn="just" fontAlgn="base">
               <a:buFont typeface="+mj-lt"/>
               <a:buAutoNum type="arabicPeriod"/>
             </a:pPr>
@@ -5746,7 +6247,7 @@
             </a:r>
           </a:p>
           <a:p>
-            <a:pPr marL="457200" indent="-457200" algn="l" fontAlgn="base">
+            <a:pPr marL="457200" indent="-457200" algn="just" fontAlgn="base">
               <a:buFont typeface="+mj-lt"/>
               <a:buAutoNum type="arabicPeriod"/>
             </a:pPr>
@@ -5763,7 +6264,7 @@
             </a:r>
           </a:p>
           <a:p>
-            <a:pPr marL="457200" indent="-457200" algn="l" fontAlgn="base">
+            <a:pPr marL="457200" indent="-457200" algn="just" fontAlgn="base">
               <a:buFont typeface="+mj-lt"/>
               <a:buAutoNum type="arabicPeriod"/>
             </a:pPr>
@@ -5788,7 +6289,7 @@
             </a:endParaRPr>
           </a:p>
           <a:p>
-            <a:pPr marL="457200" indent="-457200" algn="l" fontAlgn="base">
+            <a:pPr marL="457200" indent="-457200" algn="just" fontAlgn="base">
               <a:buFont typeface="+mj-lt"/>
               <a:buAutoNum type="arabicPeriod"/>
             </a:pPr>
@@ -5816,10 +6317,11 @@
             </a:r>
           </a:p>
           <a:p>
-            <a:pPr marL="457200" indent="-457200" algn="l" fontAlgn="base"/>
+            <a:pPr marL="457200" indent="-457200" algn="just" fontAlgn="base"/>
             <a:endParaRPr lang="ru-RU" sz="2400" dirty="0" smtClean="0"/>
           </a:p>
           <a:p>
+            <a:pPr algn="just"/>
             <a:endParaRPr lang="ru-RU" sz="2400" dirty="0"/>
           </a:p>
         </p:txBody>
@@ -5991,7 +6493,7 @@
         </p:nvSpPr>
         <p:spPr>
           <a:xfrm>
-            <a:off x="642910" y="785794"/>
+            <a:off x="642910" y="714356"/>
             <a:ext cx="7772400" cy="928694"/>
           </a:xfrm>
           <a:prstGeom prst="rect">
@@ -6062,7 +6564,7 @@
       </p:sp>
       <p:pic>
         <p:nvPicPr>
-          <p:cNvPr id="4098" name="Picture 2" descr="C:\repo\project-jastt\presentation\uml\Domain_model.png"/>
+          <p:cNvPr id="2050" name="Picture 2" descr="C:\repo\project-jastt\presentation\uml\JASTT_Domain Model.png"/>
           <p:cNvPicPr>
             <a:picLocks noChangeAspect="1" noChangeArrowheads="1"/>
           </p:cNvPicPr>
@@ -6077,8 +6579,8 @@
         </p:blipFill>
         <p:spPr bwMode="auto">
           <a:xfrm>
-            <a:off x="1428728" y="2285992"/>
-            <a:ext cx="6286500" cy="3590925"/>
+            <a:off x="571472" y="1500174"/>
+            <a:ext cx="7168695" cy="5040000"/>
           </a:xfrm>
           <a:prstGeom prst="rect">
             <a:avLst/>
@@ -6120,20 +6622,19 @@
       </p:grpSpPr>
       <p:sp>
         <p:nvSpPr>
-          <p:cNvPr id="4" name="Заголовок 3"/>
-          <p:cNvSpPr>
-            <a:spLocks noGrp="1"/>
-          </p:cNvSpPr>
-          <p:nvPr>
-            <p:ph type="ctrTitle"/>
+          <p:cNvPr id="2" name="Заголовок 1"/>
+          <p:cNvSpPr>
+            <a:spLocks noGrp="1"/>
+          </p:cNvSpPr>
+          <p:nvPr>
+            <p:ph type="title"/>
           </p:nvPr>
         </p:nvSpPr>
         <p:spPr>
           <a:xfrm>
-            <a:off x="642910" y="928670"/>
-            <a:ext cx="7772400" cy="928694"/>
-          </a:xfrm>
-          <a:noFill/>
+            <a:off x="500034" y="785794"/>
+            <a:ext cx="8229600" cy="1143000"/>
+          </a:xfrm>
         </p:spPr>
         <p:txBody>
           <a:bodyPr/>
@@ -6148,43 +6649,76 @@
                 </a:solidFill>
                 <a:latin typeface="Verdana" pitchFamily="34" charset="0"/>
               </a:rPr>
-              <a:t>JIRA Services Layer</a:t>
-            </a:r>
-            <a:endParaRPr lang="ru-RU" dirty="0">
-              <a:solidFill>
-                <a:schemeClr val="tx2">
-                  <a:lumMod val="75000"/>
-                </a:schemeClr>
-              </a:solidFill>
-              <a:latin typeface="Verdana" pitchFamily="34" charset="0"/>
-            </a:endParaRPr>
+              <a:t>DAL Providers</a:t>
+            </a:r>
+            <a:endParaRPr lang="ru-RU" dirty="0"/>
+          </a:p>
+        </p:txBody>
+      </p:sp>
+      <p:sp>
+        <p:nvSpPr>
+          <p:cNvPr id="4" name="Нижний колонтитул 3"/>
+          <p:cNvSpPr>
+            <a:spLocks noGrp="1"/>
+          </p:cNvSpPr>
+          <p:nvPr>
+            <p:ph type="ftr" sz="quarter" idx="11"/>
+          </p:nvPr>
+        </p:nvSpPr>
+        <p:spPr/>
+        <p:txBody>
+          <a:bodyPr/>
+          <a:lstStyle/>
+          <a:p>
+            <a:endParaRPr lang="ru-RU"/>
+          </a:p>
+        </p:txBody>
+      </p:sp>
+      <p:sp>
+        <p:nvSpPr>
+          <p:cNvPr id="5" name="Номер слайда 4"/>
+          <p:cNvSpPr>
+            <a:spLocks noGrp="1"/>
+          </p:cNvSpPr>
+          <p:nvPr>
+            <p:ph type="sldNum" sz="quarter" idx="12"/>
+          </p:nvPr>
+        </p:nvSpPr>
+        <p:spPr/>
+        <p:txBody>
+          <a:bodyPr/>
+          <a:lstStyle/>
+          <a:p>
+            <a:fld id="{11D68980-9ECF-4181-A23B-CB36B8F9F50A}" type="slidenum">
+              <a:rPr lang="ru-RU" smtClean="0"/>
+              <a:pPr/>
+              <a:t>7</a:t>
+            </a:fld>
+            <a:endParaRPr lang="ru-RU"/>
           </a:p>
         </p:txBody>
       </p:sp>
       <p:pic>
         <p:nvPicPr>
-          <p:cNvPr id="2052" name="Picture 4" descr="C:\repo\project-jastt\presentation\uml\JIRA_Services.bmp"/>
+          <p:cNvPr id="9" name="Содержимое 8" descr="Providers.png"/>
           <p:cNvPicPr>
-            <a:picLocks noChangeAspect="1" noChangeArrowheads="1"/>
+            <a:picLocks noGrp="1" noChangeAspect="1"/>
           </p:cNvPicPr>
-          <p:nvPr/>
+          <p:nvPr>
+            <p:ph idx="1"/>
+          </p:nvPr>
         </p:nvPicPr>
         <p:blipFill>
           <a:blip r:embed="rId2"/>
-          <a:srcRect/>
           <a:stretch>
             <a:fillRect/>
           </a:stretch>
         </p:blipFill>
-        <p:spPr bwMode="auto">
-          <a:xfrm>
-            <a:off x="142844" y="2117826"/>
-            <a:ext cx="8969176" cy="3240000"/>
-          </a:xfrm>
-          <a:prstGeom prst="rect">
-            <a:avLst/>
-          </a:prstGeom>
-          <a:noFill/>
+        <p:spPr>
+          <a:xfrm>
+            <a:off x="457200" y="2554489"/>
+            <a:ext cx="8229600" cy="2617384"/>
+          </a:xfrm>
         </p:spPr>
       </p:pic>
     </p:spTree>
@@ -6221,20 +6755,19 @@
       </p:grpSpPr>
       <p:sp>
         <p:nvSpPr>
-          <p:cNvPr id="4" name="Заголовок 3"/>
-          <p:cNvSpPr>
-            <a:spLocks noGrp="1"/>
-          </p:cNvSpPr>
-          <p:nvPr>
-            <p:ph type="ctrTitle"/>
+          <p:cNvPr id="2" name="Заголовок 1"/>
+          <p:cNvSpPr>
+            <a:spLocks noGrp="1"/>
+          </p:cNvSpPr>
+          <p:nvPr>
+            <p:ph type="title"/>
           </p:nvPr>
         </p:nvSpPr>
         <p:spPr>
           <a:xfrm>
-            <a:off x="642910" y="928670"/>
-            <a:ext cx="7772400" cy="928694"/>
-          </a:xfrm>
-          <a:noFill/>
+            <a:off x="500034" y="785794"/>
+            <a:ext cx="8229600" cy="1143000"/>
+          </a:xfrm>
         </p:spPr>
         <p:txBody>
           <a:bodyPr/>
@@ -6249,43 +6782,76 @@
                 </a:solidFill>
                 <a:latin typeface="Verdana" pitchFamily="34" charset="0"/>
               </a:rPr>
-              <a:t>Business Services</a:t>
-            </a:r>
-            <a:endParaRPr lang="ru-RU" dirty="0">
-              <a:solidFill>
-                <a:schemeClr val="tx2">
-                  <a:lumMod val="75000"/>
-                </a:schemeClr>
-              </a:solidFill>
-              <a:latin typeface="Verdana" pitchFamily="34" charset="0"/>
-            </a:endParaRPr>
+              <a:t>DAL Providers</a:t>
+            </a:r>
+            <a:endParaRPr lang="ru-RU" dirty="0"/>
+          </a:p>
+        </p:txBody>
+      </p:sp>
+      <p:sp>
+        <p:nvSpPr>
+          <p:cNvPr id="4" name="Нижний колонтитул 3"/>
+          <p:cNvSpPr>
+            <a:spLocks noGrp="1"/>
+          </p:cNvSpPr>
+          <p:nvPr>
+            <p:ph type="ftr" sz="quarter" idx="11"/>
+          </p:nvPr>
+        </p:nvSpPr>
+        <p:spPr/>
+        <p:txBody>
+          <a:bodyPr/>
+          <a:lstStyle/>
+          <a:p>
+            <a:endParaRPr lang="ru-RU"/>
+          </a:p>
+        </p:txBody>
+      </p:sp>
+      <p:sp>
+        <p:nvSpPr>
+          <p:cNvPr id="5" name="Номер слайда 4"/>
+          <p:cNvSpPr>
+            <a:spLocks noGrp="1"/>
+          </p:cNvSpPr>
+          <p:nvPr>
+            <p:ph type="sldNum" sz="quarter" idx="12"/>
+          </p:nvPr>
+        </p:nvSpPr>
+        <p:spPr/>
+        <p:txBody>
+          <a:bodyPr/>
+          <a:lstStyle/>
+          <a:p>
+            <a:fld id="{11D68980-9ECF-4181-A23B-CB36B8F9F50A}" type="slidenum">
+              <a:rPr lang="ru-RU" smtClean="0"/>
+              <a:pPr/>
+              <a:t>8</a:t>
+            </a:fld>
+            <a:endParaRPr lang="ru-RU"/>
           </a:p>
         </p:txBody>
       </p:sp>
       <p:pic>
         <p:nvPicPr>
-          <p:cNvPr id="5123" name="Picture 3" descr="C:\repo\project-jastt\presentation\uml\Service1.png"/>
+          <p:cNvPr id="7" name="Содержимое 6" descr="Providers2.png"/>
           <p:cNvPicPr>
-            <a:picLocks noChangeAspect="1" noChangeArrowheads="1"/>
+            <a:picLocks noGrp="1" noChangeAspect="1"/>
           </p:cNvPicPr>
-          <p:nvPr/>
+          <p:nvPr>
+            <p:ph idx="1"/>
+          </p:nvPr>
         </p:nvPicPr>
         <p:blipFill>
           <a:blip r:embed="rId2"/>
-          <a:srcRect/>
           <a:stretch>
             <a:fillRect/>
           </a:stretch>
         </p:blipFill>
-        <p:spPr bwMode="auto">
-          <a:xfrm>
-            <a:off x="214282" y="2071678"/>
-            <a:ext cx="8849298" cy="3240000"/>
-          </a:xfrm>
-          <a:prstGeom prst="rect">
-            <a:avLst/>
-          </a:prstGeom>
-          <a:noFill/>
+        <p:spPr>
+          <a:xfrm>
+            <a:off x="457200" y="2417967"/>
+            <a:ext cx="8229600" cy="2890428"/>
+          </a:xfrm>
         </p:spPr>
       </p:pic>
     </p:spTree>
@@ -6322,20 +6888,19 @@
       </p:grpSpPr>
       <p:sp>
         <p:nvSpPr>
-          <p:cNvPr id="4" name="Заголовок 3"/>
-          <p:cNvSpPr>
-            <a:spLocks noGrp="1"/>
-          </p:cNvSpPr>
-          <p:nvPr>
-            <p:ph type="ctrTitle"/>
+          <p:cNvPr id="2" name="Заголовок 1"/>
+          <p:cNvSpPr>
+            <a:spLocks noGrp="1"/>
+          </p:cNvSpPr>
+          <p:nvPr>
+            <p:ph type="title"/>
           </p:nvPr>
         </p:nvSpPr>
         <p:spPr>
           <a:xfrm>
-            <a:off x="642910" y="928670"/>
-            <a:ext cx="7772400" cy="928694"/>
-          </a:xfrm>
-          <a:noFill/>
+            <a:off x="500034" y="785794"/>
+            <a:ext cx="8229600" cy="1143000"/>
+          </a:xfrm>
         </p:spPr>
         <p:txBody>
           <a:bodyPr/>
@@ -6350,43 +6915,57 @@
                 </a:solidFill>
                 <a:latin typeface="Verdana" pitchFamily="34" charset="0"/>
               </a:rPr>
-              <a:t>Business Services</a:t>
-            </a:r>
-            <a:endParaRPr lang="ru-RU" dirty="0">
-              <a:solidFill>
-                <a:schemeClr val="tx2">
-                  <a:lumMod val="75000"/>
-                </a:schemeClr>
-              </a:solidFill>
-              <a:latin typeface="Verdana" pitchFamily="34" charset="0"/>
-            </a:endParaRPr>
+              <a:t>DAL Providers</a:t>
+            </a:r>
+            <a:endParaRPr lang="ru-RU" dirty="0"/>
+          </a:p>
+        </p:txBody>
+      </p:sp>
+      <p:sp>
+        <p:nvSpPr>
+          <p:cNvPr id="5" name="Номер слайда 4"/>
+          <p:cNvSpPr>
+            <a:spLocks noGrp="1"/>
+          </p:cNvSpPr>
+          <p:nvPr>
+            <p:ph type="sldNum" sz="quarter" idx="12"/>
+          </p:nvPr>
+        </p:nvSpPr>
+        <p:spPr/>
+        <p:txBody>
+          <a:bodyPr/>
+          <a:lstStyle/>
+          <a:p>
+            <a:fld id="{11D68980-9ECF-4181-A23B-CB36B8F9F50A}" type="slidenum">
+              <a:rPr lang="ru-RU" smtClean="0"/>
+              <a:pPr/>
+              <a:t>9</a:t>
+            </a:fld>
+            <a:endParaRPr lang="ru-RU"/>
           </a:p>
         </p:txBody>
       </p:sp>
       <p:pic>
         <p:nvPicPr>
-          <p:cNvPr id="6146" name="Picture 2" descr="C:\repo\project-jastt\presentation\uml\Service2.png"/>
+          <p:cNvPr id="8" name="Содержимое 7" descr="Providers2.png"/>
           <p:cNvPicPr>
-            <a:picLocks noChangeAspect="1" noChangeArrowheads="1"/>
+            <a:picLocks noGrp="1" noChangeAspect="1"/>
           </p:cNvPicPr>
-          <p:nvPr/>
+          <p:nvPr>
+            <p:ph idx="1"/>
+          </p:nvPr>
         </p:nvPicPr>
         <p:blipFill>
           <a:blip r:embed="rId2"/>
-          <a:srcRect/>
           <a:stretch>
             <a:fillRect/>
           </a:stretch>
         </p:blipFill>
-        <p:spPr bwMode="auto">
-          <a:xfrm>
-            <a:off x="142844" y="2143116"/>
-            <a:ext cx="8886370" cy="3240000"/>
-          </a:xfrm>
-          <a:prstGeom prst="rect">
-            <a:avLst/>
-          </a:prstGeom>
-          <a:noFill/>
+        <p:spPr>
+          <a:xfrm>
+            <a:off x="457200" y="2479840"/>
+            <a:ext cx="8229600" cy="2766683"/>
+          </a:xfrm>
         </p:spPr>
       </p:pic>
     </p:spTree>

</xml_diff>

<commit_message>
Slide with Jira Services uml diagram is after business services diagrams slide now.
</commit_message>
<xml_diff>
--- a/presentation/jastt.pptx
+++ b/presentation/jastt.pptx
@@ -17,11 +17,11 @@
     <p:sldId id="266" r:id="rId5"/>
     <p:sldId id="258" r:id="rId6"/>
     <p:sldId id="261" r:id="rId7"/>
-    <p:sldId id="260" r:id="rId8"/>
-    <p:sldId id="273" r:id="rId9"/>
-    <p:sldId id="275" r:id="rId10"/>
-    <p:sldId id="262" r:id="rId11"/>
-    <p:sldId id="263" r:id="rId12"/>
+    <p:sldId id="273" r:id="rId8"/>
+    <p:sldId id="275" r:id="rId9"/>
+    <p:sldId id="262" r:id="rId10"/>
+    <p:sldId id="263" r:id="rId11"/>
+    <p:sldId id="260" r:id="rId12"/>
     <p:sldId id="267" r:id="rId13"/>
     <p:sldId id="269" r:id="rId14"/>
     <p:sldId id="271" r:id="rId15"/>
@@ -3957,7 +3957,7 @@
       </p:sp>
       <p:pic>
         <p:nvPicPr>
-          <p:cNvPr id="5123" name="Picture 3" descr="C:\repo\project-jastt\presentation\uml\Service1.png"/>
+          <p:cNvPr id="6146" name="Picture 2" descr="C:\repo\project-jastt\presentation\uml\Service2.png"/>
           <p:cNvPicPr>
             <a:picLocks noChangeAspect="1" noChangeArrowheads="1"/>
           </p:cNvPicPr>
@@ -3972,8 +3972,8 @@
         </p:blipFill>
         <p:spPr bwMode="auto">
           <a:xfrm>
-            <a:off x="214282" y="2071678"/>
-            <a:ext cx="8849298" cy="3240000"/>
+            <a:off x="142844" y="2143116"/>
+            <a:ext cx="8886370" cy="3240000"/>
           </a:xfrm>
           <a:prstGeom prst="rect">
             <a:avLst/>
@@ -4043,7 +4043,7 @@
                 </a:solidFill>
                 <a:latin typeface="Verdana" pitchFamily="34" charset="0"/>
               </a:rPr>
-              <a:t>Business Services</a:t>
+              <a:t>JIRA Services Layer</a:t>
             </a:r>
             <a:endParaRPr lang="ru-RU" dirty="0">
               <a:solidFill>
@@ -4058,7 +4058,7 @@
       </p:sp>
       <p:pic>
         <p:nvPicPr>
-          <p:cNvPr id="6146" name="Picture 2" descr="C:\repo\project-jastt\presentation\uml\Service2.png"/>
+          <p:cNvPr id="2052" name="Picture 4" descr="C:\repo\project-jastt\presentation\uml\JIRA_Services.bmp"/>
           <p:cNvPicPr>
             <a:picLocks noChangeAspect="1" noChangeArrowheads="1"/>
           </p:cNvPicPr>
@@ -4073,8 +4073,8 @@
         </p:blipFill>
         <p:spPr bwMode="auto">
           <a:xfrm>
-            <a:off x="142844" y="2143116"/>
-            <a:ext cx="8886370" cy="3240000"/>
+            <a:off x="142844" y="2117826"/>
+            <a:ext cx="8969176" cy="3240000"/>
           </a:xfrm>
           <a:prstGeom prst="rect">
             <a:avLst/>
@@ -5026,7 +5026,7 @@
           <a:blip r:embed="rId2" cstate="print">
             <a:extLst>
               <a:ext uri="{28A0092B-C50C-407E-A947-70E740481C1C}">
-                <a14:useLocalDpi xmlns="" xmlns:a14="http://schemas.microsoft.com/office/drawing/2010/main" val="0"/>
+                <a14:useLocalDpi xmlns:a14="http://schemas.microsoft.com/office/drawing/2010/main" xmlns="" val="0"/>
               </a:ext>
             </a:extLst>
           </a:blip>
@@ -5050,7 +5050,7 @@
           <a:effectLst/>
           <a:extLst>
             <a:ext uri="{909E8E84-426E-40DD-AFC4-6F175D3DCCD1}">
-              <a14:hiddenFill xmlns="" xmlns:a14="http://schemas.microsoft.com/office/drawing/2010/main">
+              <a14:hiddenFill xmlns:a14="http://schemas.microsoft.com/office/drawing/2010/main" xmlns="">
                 <a:blipFill dpi="0" rotWithShape="0">
                   <a:blip/>
                   <a:srcRect/>
@@ -5061,7 +5061,7 @@
               </a14:hiddenFill>
             </a:ext>
             <a:ext uri="{91240B29-F687-4F45-9708-019B960494DF}">
-              <a14:hiddenLine xmlns="" xmlns:a14="http://schemas.microsoft.com/office/drawing/2010/main" w="9525">
+              <a14:hiddenLine xmlns:a14="http://schemas.microsoft.com/office/drawing/2010/main" xmlns="" w="9525">
                 <a:solidFill>
                   <a:srgbClr val="808080"/>
                 </a:solidFill>
@@ -5071,7 +5071,7 @@
               </a14:hiddenLine>
             </a:ext>
             <a:ext uri="{AF507438-7753-43E0-B8FC-AC1667EBCBE1}">
-              <a14:hiddenEffects xmlns="" xmlns:a14="http://schemas.microsoft.com/office/drawing/2010/main">
+              <a14:hiddenEffects xmlns:a14="http://schemas.microsoft.com/office/drawing/2010/main" xmlns="">
                 <a:effectLst>
                   <a:outerShdw dist="35921" dir="2700000" algn="ctr" rotWithShape="0">
                     <a:srgbClr val="808080"/>
@@ -5094,7 +5094,7 @@
           <a:blip r:embed="rId3" cstate="print">
             <a:extLst>
               <a:ext uri="{28A0092B-C50C-407E-A947-70E740481C1C}">
-                <a14:useLocalDpi xmlns="" xmlns:a14="http://schemas.microsoft.com/office/drawing/2010/main" val="0"/>
+                <a14:useLocalDpi xmlns:a14="http://schemas.microsoft.com/office/drawing/2010/main" xmlns="" val="0"/>
               </a:ext>
             </a:extLst>
           </a:blip>
@@ -5118,7 +5118,7 @@
           <a:effectLst/>
           <a:extLst>
             <a:ext uri="{909E8E84-426E-40DD-AFC4-6F175D3DCCD1}">
-              <a14:hiddenFill xmlns="" xmlns:a14="http://schemas.microsoft.com/office/drawing/2010/main">
+              <a14:hiddenFill xmlns:a14="http://schemas.microsoft.com/office/drawing/2010/main" xmlns="">
                 <a:blipFill dpi="0" rotWithShape="0">
                   <a:blip/>
                   <a:srcRect/>
@@ -5129,7 +5129,7 @@
               </a14:hiddenFill>
             </a:ext>
             <a:ext uri="{91240B29-F687-4F45-9708-019B960494DF}">
-              <a14:hiddenLine xmlns="" xmlns:a14="http://schemas.microsoft.com/office/drawing/2010/main" w="9525">
+              <a14:hiddenLine xmlns:a14="http://schemas.microsoft.com/office/drawing/2010/main" xmlns="" w="9525">
                 <a:solidFill>
                   <a:srgbClr val="808080"/>
                 </a:solidFill>
@@ -5139,7 +5139,7 @@
               </a14:hiddenLine>
             </a:ext>
             <a:ext uri="{AF507438-7753-43E0-B8FC-AC1667EBCBE1}">
-              <a14:hiddenEffects xmlns="" xmlns:a14="http://schemas.microsoft.com/office/drawing/2010/main">
+              <a14:hiddenEffects xmlns:a14="http://schemas.microsoft.com/office/drawing/2010/main" xmlns="">
                 <a:effectLst>
                   <a:outerShdw dist="35921" dir="2700000" algn="ctr" rotWithShape="0">
                     <a:srgbClr val="808080"/>
@@ -5162,7 +5162,7 @@
           <a:blip r:embed="rId4" cstate="print">
             <a:extLst>
               <a:ext uri="{28A0092B-C50C-407E-A947-70E740481C1C}">
-                <a14:useLocalDpi xmlns="" xmlns:a14="http://schemas.microsoft.com/office/drawing/2010/main" val="0"/>
+                <a14:useLocalDpi xmlns:a14="http://schemas.microsoft.com/office/drawing/2010/main" xmlns="" val="0"/>
               </a:ext>
             </a:extLst>
           </a:blip>
@@ -5186,7 +5186,7 @@
           <a:effectLst/>
           <a:extLst>
             <a:ext uri="{909E8E84-426E-40DD-AFC4-6F175D3DCCD1}">
-              <a14:hiddenFill xmlns="" xmlns:a14="http://schemas.microsoft.com/office/drawing/2010/main">
+              <a14:hiddenFill xmlns:a14="http://schemas.microsoft.com/office/drawing/2010/main" xmlns="">
                 <a:blipFill dpi="0" rotWithShape="0">
                   <a:blip/>
                   <a:srcRect/>
@@ -5197,7 +5197,7 @@
               </a14:hiddenFill>
             </a:ext>
             <a:ext uri="{91240B29-F687-4F45-9708-019B960494DF}">
-              <a14:hiddenLine xmlns="" xmlns:a14="http://schemas.microsoft.com/office/drawing/2010/main" w="9525">
+              <a14:hiddenLine xmlns:a14="http://schemas.microsoft.com/office/drawing/2010/main" xmlns="" w="9525">
                 <a:solidFill>
                   <a:srgbClr val="808080"/>
                 </a:solidFill>
@@ -5207,7 +5207,7 @@
               </a14:hiddenLine>
             </a:ext>
             <a:ext uri="{AF507438-7753-43E0-B8FC-AC1667EBCBE1}">
-              <a14:hiddenEffects xmlns="" xmlns:a14="http://schemas.microsoft.com/office/drawing/2010/main">
+              <a14:hiddenEffects xmlns:a14="http://schemas.microsoft.com/office/drawing/2010/main" xmlns="">
                 <a:effectLst>
                   <a:outerShdw dist="35921" dir="2700000" algn="ctr" rotWithShape="0">
                     <a:srgbClr val="808080"/>
@@ -5230,7 +5230,7 @@
           <a:blip r:embed="rId5" cstate="print">
             <a:extLst>
               <a:ext uri="{28A0092B-C50C-407E-A947-70E740481C1C}">
-                <a14:useLocalDpi xmlns="" xmlns:a14="http://schemas.microsoft.com/office/drawing/2010/main" val="0"/>
+                <a14:useLocalDpi xmlns:a14="http://schemas.microsoft.com/office/drawing/2010/main" xmlns="" val="0"/>
               </a:ext>
             </a:extLst>
           </a:blip>
@@ -5253,14 +5253,14 @@
           </a:ln>
           <a:extLst>
             <a:ext uri="{909E8E84-426E-40DD-AFC4-6F175D3DCCD1}">
-              <a14:hiddenFill xmlns="" xmlns:a14="http://schemas.microsoft.com/office/drawing/2010/main">
+              <a14:hiddenFill xmlns:a14="http://schemas.microsoft.com/office/drawing/2010/main" xmlns="">
                 <a:solidFill>
                   <a:schemeClr val="accent1"/>
                 </a:solidFill>
               </a14:hiddenFill>
             </a:ext>
             <a:ext uri="{91240B29-F687-4F45-9708-019B960494DF}">
-              <a14:hiddenLine xmlns="" xmlns:a14="http://schemas.microsoft.com/office/drawing/2010/main" w="9525">
+              <a14:hiddenLine xmlns:a14="http://schemas.microsoft.com/office/drawing/2010/main" xmlns="" w="9525">
                 <a:solidFill>
                   <a:schemeClr val="tx1"/>
                 </a:solidFill>
@@ -5284,7 +5284,7 @@
           <a:blip r:embed="rId6" cstate="print">
             <a:extLst>
               <a:ext uri="{28A0092B-C50C-407E-A947-70E740481C1C}">
-                <a14:useLocalDpi xmlns="" xmlns:a14="http://schemas.microsoft.com/office/drawing/2010/main" val="0"/>
+                <a14:useLocalDpi xmlns:a14="http://schemas.microsoft.com/office/drawing/2010/main" xmlns="" val="0"/>
               </a:ext>
             </a:extLst>
           </a:blip>
@@ -5308,7 +5308,7 @@
           <a:effectLst/>
           <a:extLst>
             <a:ext uri="{909E8E84-426E-40DD-AFC4-6F175D3DCCD1}">
-              <a14:hiddenFill xmlns="" xmlns:a14="http://schemas.microsoft.com/office/drawing/2010/main">
+              <a14:hiddenFill xmlns:a14="http://schemas.microsoft.com/office/drawing/2010/main" xmlns="">
                 <a:blipFill dpi="0" rotWithShape="0">
                   <a:blip/>
                   <a:srcRect/>
@@ -5319,7 +5319,7 @@
               </a14:hiddenFill>
             </a:ext>
             <a:ext uri="{91240B29-F687-4F45-9708-019B960494DF}">
-              <a14:hiddenLine xmlns="" xmlns:a14="http://schemas.microsoft.com/office/drawing/2010/main" w="9525">
+              <a14:hiddenLine xmlns:a14="http://schemas.microsoft.com/office/drawing/2010/main" xmlns="" w="9525">
                 <a:solidFill>
                   <a:srgbClr val="808080"/>
                 </a:solidFill>
@@ -5329,7 +5329,7 @@
               </a14:hiddenLine>
             </a:ext>
             <a:ext uri="{AF507438-7753-43E0-B8FC-AC1667EBCBE1}">
-              <a14:hiddenEffects xmlns="" xmlns:a14="http://schemas.microsoft.com/office/drawing/2010/main">
+              <a14:hiddenEffects xmlns:a14="http://schemas.microsoft.com/office/drawing/2010/main" xmlns="">
                 <a:effectLst>
                   <a:outerShdw dist="35921" dir="2700000" algn="ctr" rotWithShape="0">
                     <a:srgbClr val="808080"/>
@@ -5352,7 +5352,7 @@
           <a:blip r:embed="rId7" cstate="print">
             <a:extLst>
               <a:ext uri="{28A0092B-C50C-407E-A947-70E740481C1C}">
-                <a14:useLocalDpi xmlns="" xmlns:a14="http://schemas.microsoft.com/office/drawing/2010/main" val="0"/>
+                <a14:useLocalDpi xmlns:a14="http://schemas.microsoft.com/office/drawing/2010/main" xmlns="" val="0"/>
               </a:ext>
             </a:extLst>
           </a:blip>
@@ -5376,7 +5376,7 @@
           <a:effectLst/>
           <a:extLst>
             <a:ext uri="{909E8E84-426E-40DD-AFC4-6F175D3DCCD1}">
-              <a14:hiddenFill xmlns="" xmlns:a14="http://schemas.microsoft.com/office/drawing/2010/main">
+              <a14:hiddenFill xmlns:a14="http://schemas.microsoft.com/office/drawing/2010/main" xmlns="">
                 <a:blipFill dpi="0" rotWithShape="0">
                   <a:blip/>
                   <a:srcRect/>
@@ -5387,7 +5387,7 @@
               </a14:hiddenFill>
             </a:ext>
             <a:ext uri="{91240B29-F687-4F45-9708-019B960494DF}">
-              <a14:hiddenLine xmlns="" xmlns:a14="http://schemas.microsoft.com/office/drawing/2010/main" w="9525">
+              <a14:hiddenLine xmlns:a14="http://schemas.microsoft.com/office/drawing/2010/main" xmlns="" w="9525">
                 <a:solidFill>
                   <a:srgbClr val="808080"/>
                 </a:solidFill>
@@ -5397,7 +5397,7 @@
               </a14:hiddenLine>
             </a:ext>
             <a:ext uri="{AF507438-7753-43E0-B8FC-AC1667EBCBE1}">
-              <a14:hiddenEffects xmlns="" xmlns:a14="http://schemas.microsoft.com/office/drawing/2010/main">
+              <a14:hiddenEffects xmlns:a14="http://schemas.microsoft.com/office/drawing/2010/main" xmlns="">
                 <a:effectLst>
                   <a:outerShdw dist="35921" dir="2700000" algn="ctr" rotWithShape="0">
                     <a:srgbClr val="808080"/>
@@ -6934,20 +6934,19 @@
       </p:grpSpPr>
       <p:sp>
         <p:nvSpPr>
-          <p:cNvPr id="4" name="Заголовок 3"/>
-          <p:cNvSpPr>
-            <a:spLocks noGrp="1"/>
-          </p:cNvSpPr>
-          <p:nvPr>
-            <p:ph type="ctrTitle"/>
+          <p:cNvPr id="2" name="Заголовок 1"/>
+          <p:cNvSpPr>
+            <a:spLocks noGrp="1"/>
+          </p:cNvSpPr>
+          <p:nvPr>
+            <p:ph type="title"/>
           </p:nvPr>
         </p:nvSpPr>
         <p:spPr>
           <a:xfrm>
-            <a:off x="642910" y="928670"/>
-            <a:ext cx="7772400" cy="928694"/>
-          </a:xfrm>
-          <a:noFill/>
+            <a:off x="500034" y="785794"/>
+            <a:ext cx="8229600" cy="1143000"/>
+          </a:xfrm>
         </p:spPr>
         <p:txBody>
           <a:bodyPr/>
@@ -6962,43 +6961,76 @@
                 </a:solidFill>
                 <a:latin typeface="Verdana" pitchFamily="34" charset="0"/>
               </a:rPr>
-              <a:t>JIRA Services Layer</a:t>
-            </a:r>
-            <a:endParaRPr lang="ru-RU" dirty="0">
-              <a:solidFill>
-                <a:schemeClr val="tx2">
-                  <a:lumMod val="75000"/>
-                </a:schemeClr>
-              </a:solidFill>
-              <a:latin typeface="Verdana" pitchFamily="34" charset="0"/>
-            </a:endParaRPr>
+              <a:t>DAL Providers</a:t>
+            </a:r>
+            <a:endParaRPr lang="ru-RU" dirty="0"/>
+          </a:p>
+        </p:txBody>
+      </p:sp>
+      <p:sp>
+        <p:nvSpPr>
+          <p:cNvPr id="4" name="Нижний колонтитул 3"/>
+          <p:cNvSpPr>
+            <a:spLocks noGrp="1"/>
+          </p:cNvSpPr>
+          <p:nvPr>
+            <p:ph type="ftr" sz="quarter" idx="11"/>
+          </p:nvPr>
+        </p:nvSpPr>
+        <p:spPr/>
+        <p:txBody>
+          <a:bodyPr/>
+          <a:lstStyle/>
+          <a:p>
+            <a:endParaRPr lang="ru-RU"/>
+          </a:p>
+        </p:txBody>
+      </p:sp>
+      <p:sp>
+        <p:nvSpPr>
+          <p:cNvPr id="5" name="Номер слайда 4"/>
+          <p:cNvSpPr>
+            <a:spLocks noGrp="1"/>
+          </p:cNvSpPr>
+          <p:nvPr>
+            <p:ph type="sldNum" sz="quarter" idx="12"/>
+          </p:nvPr>
+        </p:nvSpPr>
+        <p:spPr/>
+        <p:txBody>
+          <a:bodyPr/>
+          <a:lstStyle/>
+          <a:p>
+            <a:fld id="{11D68980-9ECF-4181-A23B-CB36B8F9F50A}" type="slidenum">
+              <a:rPr lang="ru-RU" smtClean="0"/>
+              <a:pPr/>
+              <a:t>7</a:t>
+            </a:fld>
+            <a:endParaRPr lang="ru-RU"/>
           </a:p>
         </p:txBody>
       </p:sp>
       <p:pic>
         <p:nvPicPr>
-          <p:cNvPr id="2052" name="Picture 4" descr="C:\repo\project-jastt\presentation\uml\JIRA_Services.bmp"/>
+          <p:cNvPr id="9" name="Содержимое 8" descr="Providers.png"/>
           <p:cNvPicPr>
-            <a:picLocks noChangeAspect="1" noChangeArrowheads="1"/>
+            <a:picLocks noGrp="1" noChangeAspect="1"/>
           </p:cNvPicPr>
-          <p:nvPr/>
+          <p:nvPr>
+            <p:ph idx="1"/>
+          </p:nvPr>
         </p:nvPicPr>
         <p:blipFill>
           <a:blip r:embed="rId2"/>
-          <a:srcRect/>
           <a:stretch>
             <a:fillRect/>
           </a:stretch>
         </p:blipFill>
-        <p:spPr bwMode="auto">
-          <a:xfrm>
-            <a:off x="142844" y="2117826"/>
-            <a:ext cx="8969176" cy="3240000"/>
-          </a:xfrm>
-          <a:prstGeom prst="rect">
-            <a:avLst/>
-          </a:prstGeom>
-          <a:noFill/>
+        <p:spPr>
+          <a:xfrm>
+            <a:off x="457200" y="2554489"/>
+            <a:ext cx="8229600" cy="2617384"/>
+          </a:xfrm>
         </p:spPr>
       </p:pic>
     </p:spTree>
@@ -7070,25 +7102,6 @@
       </p:sp>
       <p:sp>
         <p:nvSpPr>
-          <p:cNvPr id="4" name="Нижний колонтитул 3"/>
-          <p:cNvSpPr>
-            <a:spLocks noGrp="1"/>
-          </p:cNvSpPr>
-          <p:nvPr>
-            <p:ph type="ftr" sz="quarter" idx="11"/>
-          </p:nvPr>
-        </p:nvSpPr>
-        <p:spPr/>
-        <p:txBody>
-          <a:bodyPr/>
-          <a:lstStyle/>
-          <a:p>
-            <a:endParaRPr lang="ru-RU"/>
-          </a:p>
-        </p:txBody>
-      </p:sp>
-      <p:sp>
-        <p:nvSpPr>
           <p:cNvPr id="5" name="Номер слайда 4"/>
           <p:cNvSpPr>
             <a:spLocks noGrp="1"/>
@@ -7113,7 +7126,7 @@
       </p:sp>
       <p:pic>
         <p:nvPicPr>
-          <p:cNvPr id="9" name="Содержимое 8" descr="Providers.png"/>
+          <p:cNvPr id="8" name="Содержимое 7" descr="Providers2.png"/>
           <p:cNvPicPr>
             <a:picLocks noGrp="1" noChangeAspect="1"/>
           </p:cNvPicPr>
@@ -7129,8 +7142,8 @@
         </p:blipFill>
         <p:spPr>
           <a:xfrm>
-            <a:off x="457200" y="2554489"/>
-            <a:ext cx="8229600" cy="2617384"/>
+            <a:off x="457200" y="2479840"/>
+            <a:ext cx="8229600" cy="2766683"/>
           </a:xfrm>
         </p:spPr>
       </p:pic>
@@ -7168,19 +7181,20 @@
       </p:grpSpPr>
       <p:sp>
         <p:nvSpPr>
-          <p:cNvPr id="2" name="Заголовок 1"/>
-          <p:cNvSpPr>
-            <a:spLocks noGrp="1"/>
-          </p:cNvSpPr>
-          <p:nvPr>
-            <p:ph type="title"/>
+          <p:cNvPr id="4" name="Заголовок 3"/>
+          <p:cNvSpPr>
+            <a:spLocks noGrp="1"/>
+          </p:cNvSpPr>
+          <p:nvPr>
+            <p:ph type="ctrTitle"/>
           </p:nvPr>
         </p:nvSpPr>
         <p:spPr>
           <a:xfrm>
-            <a:off x="500034" y="785794"/>
-            <a:ext cx="8229600" cy="1143000"/>
-          </a:xfrm>
+            <a:off x="642910" y="928670"/>
+            <a:ext cx="7772400" cy="928694"/>
+          </a:xfrm>
+          <a:noFill/>
         </p:spPr>
         <p:txBody>
           <a:bodyPr/>
@@ -7195,57 +7209,43 @@
                 </a:solidFill>
                 <a:latin typeface="Verdana" pitchFamily="34" charset="0"/>
               </a:rPr>
-              <a:t>DAL Providers</a:t>
-            </a:r>
-            <a:endParaRPr lang="ru-RU" dirty="0"/>
-          </a:p>
-        </p:txBody>
-      </p:sp>
-      <p:sp>
-        <p:nvSpPr>
-          <p:cNvPr id="5" name="Номер слайда 4"/>
-          <p:cNvSpPr>
-            <a:spLocks noGrp="1"/>
-          </p:cNvSpPr>
-          <p:nvPr>
-            <p:ph type="sldNum" sz="quarter" idx="12"/>
-          </p:nvPr>
-        </p:nvSpPr>
-        <p:spPr/>
-        <p:txBody>
-          <a:bodyPr/>
-          <a:lstStyle/>
-          <a:p>
-            <a:fld id="{11D68980-9ECF-4181-A23B-CB36B8F9F50A}" type="slidenum">
-              <a:rPr lang="ru-RU" smtClean="0"/>
-              <a:pPr/>
-              <a:t>9</a:t>
-            </a:fld>
-            <a:endParaRPr lang="ru-RU"/>
+              <a:t>Business Services</a:t>
+            </a:r>
+            <a:endParaRPr lang="ru-RU" dirty="0">
+              <a:solidFill>
+                <a:schemeClr val="tx2">
+                  <a:lumMod val="75000"/>
+                </a:schemeClr>
+              </a:solidFill>
+              <a:latin typeface="Verdana" pitchFamily="34" charset="0"/>
+            </a:endParaRPr>
           </a:p>
         </p:txBody>
       </p:sp>
       <p:pic>
         <p:nvPicPr>
-          <p:cNvPr id="8" name="Содержимое 7" descr="Providers2.png"/>
+          <p:cNvPr id="5123" name="Picture 3" descr="C:\repo\project-jastt\presentation\uml\Service1.png"/>
           <p:cNvPicPr>
-            <a:picLocks noGrp="1" noChangeAspect="1"/>
+            <a:picLocks noChangeAspect="1" noChangeArrowheads="1"/>
           </p:cNvPicPr>
-          <p:nvPr>
-            <p:ph idx="1"/>
-          </p:nvPr>
+          <p:nvPr/>
         </p:nvPicPr>
         <p:blipFill>
           <a:blip r:embed="rId2"/>
+          <a:srcRect/>
           <a:stretch>
             <a:fillRect/>
           </a:stretch>
         </p:blipFill>
-        <p:spPr>
-          <a:xfrm>
-            <a:off x="457200" y="2479840"/>
-            <a:ext cx="8229600" cy="2766683"/>
-          </a:xfrm>
+        <p:spPr bwMode="auto">
+          <a:xfrm>
+            <a:off x="214282" y="2071678"/>
+            <a:ext cx="8849298" cy="3240000"/>
+          </a:xfrm>
+          <a:prstGeom prst="rect">
+            <a:avLst/>
+          </a:prstGeom>
+          <a:noFill/>
         </p:spPr>
       </p:pic>
     </p:spTree>

</xml_diff>

<commit_message>
Presentation slides headers were changed. Structure for design and architecture slide was edited. New worklog report example was added.
</commit_message>
<xml_diff>
--- a/presentation/jastt.pptx
+++ b/presentation/jastt.pptx
@@ -217,7 +217,7 @@
             <a:fld id="{D400A1D8-D64A-4241-AF86-42F2AD4B56BF}" type="datetimeFigureOut">
               <a:rPr lang="ru-RU" smtClean="0"/>
               <a:pPr/>
-              <a:t>26.01.2015</a:t>
+              <a:t>27.01.2015</a:t>
             </a:fld>
             <a:endParaRPr lang="ru-RU"/>
           </a:p>
@@ -293,7 +293,7 @@
     </p:spTree>
   </p:cSld>
   <p:clrMap bg1="lt1" tx1="dk1" bg2="lt2" tx2="dk2" accent1="accent1" accent2="accent2" accent3="accent3" accent4="accent4" accent5="accent5" accent6="accent6" hlink="hlink" folHlink="folHlink"/>
-  <p:hf hdr="0" dt="0"/>
+  <p:hf hdr="0" ftr="0" dt="0"/>
 </p:handoutMaster>
 </file>
 
@@ -380,7 +380,7 @@
             <a:fld id="{4BC55E99-C85B-4B76-9126-FABAB920BA23}" type="datetimeFigureOut">
               <a:rPr lang="ru-RU" smtClean="0"/>
               <a:pPr/>
-              <a:t>26.01.2015</a:t>
+              <a:t>27.01.2015</a:t>
             </a:fld>
             <a:endParaRPr lang="ru-RU"/>
           </a:p>
@@ -551,7 +551,7 @@
     </p:spTree>
   </p:cSld>
   <p:clrMap bg1="lt1" tx1="dk1" bg2="lt2" tx2="dk2" accent1="accent1" accent2="accent2" accent3="accent3" accent4="accent4" accent5="accent5" accent6="accent6" hlink="hlink" folHlink="folHlink"/>
-  <p:hf hdr="0" dt="0"/>
+  <p:hf hdr="0" ftr="0" dt="0"/>
   <p:notesStyle>
     <a:lvl1pPr marL="0" algn="l" defTabSz="914400" rtl="0" eaLnBrk="1" latinLnBrk="0" hangingPunct="1">
       <a:defRPr sz="1200" kern="1200">
@@ -721,14 +721,72 @@
           </a:p>
         </p:txBody>
       </p:sp>
-      <p:sp>
-        <p:nvSpPr>
-          <p:cNvPr id="5" name="Нижний колонтитул 4"/>
-          <p:cNvSpPr>
-            <a:spLocks noGrp="1"/>
-          </p:cNvSpPr>
-          <p:nvPr>
-            <p:ph type="ftr" sz="quarter" idx="11"/>
+    </p:spTree>
+  </p:cSld>
+  <p:clrMapOvr>
+    <a:masterClrMapping/>
+  </p:clrMapOvr>
+</p:notes>
+</file>
+
+<file path=ppt/notesSlides/notesSlide2.xml><?xml version="1.0" encoding="utf-8"?>
+<p:notes xmlns:a="http://schemas.openxmlformats.org/drawingml/2006/main" xmlns:r="http://schemas.openxmlformats.org/officeDocument/2006/relationships" xmlns:p="http://schemas.openxmlformats.org/presentationml/2006/main">
+  <p:cSld>
+    <p:spTree>
+      <p:nvGrpSpPr>
+        <p:cNvPr id="1" name=""/>
+        <p:cNvGrpSpPr/>
+        <p:nvPr/>
+      </p:nvGrpSpPr>
+      <p:grpSpPr>
+        <a:xfrm>
+          <a:off x="0" y="0"/>
+          <a:ext cx="0" cy="0"/>
+          <a:chOff x="0" y="0"/>
+          <a:chExt cx="0" cy="0"/>
+        </a:xfrm>
+      </p:grpSpPr>
+      <p:sp>
+        <p:nvSpPr>
+          <p:cNvPr id="2" name="Образ слайда 1"/>
+          <p:cNvSpPr>
+            <a:spLocks noGrp="1" noRot="1" noChangeAspect="1"/>
+          </p:cNvSpPr>
+          <p:nvPr>
+            <p:ph type="sldImg"/>
+          </p:nvPr>
+        </p:nvSpPr>
+        <p:spPr/>
+      </p:sp>
+      <p:sp>
+        <p:nvSpPr>
+          <p:cNvPr id="3" name="Заметки 2"/>
+          <p:cNvSpPr>
+            <a:spLocks noGrp="1"/>
+          </p:cNvSpPr>
+          <p:nvPr>
+            <p:ph type="body" idx="1"/>
+          </p:nvPr>
+        </p:nvSpPr>
+        <p:spPr/>
+        <p:txBody>
+          <a:bodyPr>
+            <a:normAutofit/>
+          </a:bodyPr>
+          <a:lstStyle/>
+          <a:p>
+            <a:endParaRPr lang="ru-RU" dirty="0"/>
+          </a:p>
+        </p:txBody>
+      </p:sp>
+      <p:sp>
+        <p:nvSpPr>
+          <p:cNvPr id="4" name="Номер слайда 3"/>
+          <p:cNvSpPr>
+            <a:spLocks noGrp="1"/>
+          </p:cNvSpPr>
+          <p:nvPr>
+            <p:ph type="sldNum" sz="quarter" idx="10"/>
           </p:nvPr>
         </p:nvSpPr>
         <p:spPr/>
@@ -736,6 +794,11 @@
           <a:bodyPr/>
           <a:lstStyle/>
           <a:p>
+            <a:fld id="{BD50F417-8746-4846-8743-4C5B24A593FE}" type="slidenum">
+              <a:rPr lang="ru-RU" smtClean="0"/>
+              <a:pPr/>
+              <a:t>21</a:t>
+            </a:fld>
             <a:endParaRPr lang="ru-RU"/>
           </a:p>
         </p:txBody>
@@ -927,10 +990,10 @@
           <a:bodyPr/>
           <a:lstStyle/>
           <a:p>
-            <a:fld id="{B480C0D4-6802-4DB9-A251-EBC8F28B0DAE}" type="datetime1">
+            <a:fld id="{44CBAC76-C8DD-4EEA-8C93-891112F4143C}" type="datetime1">
               <a:rPr lang="ru-RU" smtClean="0"/>
               <a:pPr/>
-              <a:t>26.01.2015</a:t>
+              <a:t>27.01.2015</a:t>
             </a:fld>
             <a:endParaRPr lang="ru-RU"/>
           </a:p>
@@ -1094,10 +1157,10 @@
           <a:bodyPr/>
           <a:lstStyle/>
           <a:p>
-            <a:fld id="{F711D1E9-9E08-43CA-A7BC-7A0C069E8D7A}" type="datetime1">
+            <a:fld id="{E0179916-ED82-49C8-9F21-A341413CA9B8}" type="datetime1">
               <a:rPr lang="ru-RU" smtClean="0"/>
               <a:pPr/>
-              <a:t>26.01.2015</a:t>
+              <a:t>27.01.2015</a:t>
             </a:fld>
             <a:endParaRPr lang="ru-RU"/>
           </a:p>
@@ -1271,10 +1334,10 @@
           <a:bodyPr/>
           <a:lstStyle/>
           <a:p>
-            <a:fld id="{C7BD5076-B1D1-4F0F-9C66-86B4A5CF23FF}" type="datetime1">
+            <a:fld id="{3F0C22FA-3D87-480D-977D-81E0526A209A}" type="datetime1">
               <a:rPr lang="ru-RU" smtClean="0"/>
               <a:pPr/>
-              <a:t>26.01.2015</a:t>
+              <a:t>27.01.2015</a:t>
             </a:fld>
             <a:endParaRPr lang="ru-RU"/>
           </a:p>
@@ -1438,10 +1501,10 @@
           <a:bodyPr/>
           <a:lstStyle/>
           <a:p>
-            <a:fld id="{5AD0EC6D-C93F-44B8-885A-8A8BBF442E56}" type="datetime1">
+            <a:fld id="{68174BE3-1926-4787-B849-F42308FE6CA9}" type="datetime1">
               <a:rPr lang="ru-RU" smtClean="0"/>
               <a:pPr/>
-              <a:t>26.01.2015</a:t>
+              <a:t>27.01.2015</a:t>
             </a:fld>
             <a:endParaRPr lang="ru-RU"/>
           </a:p>
@@ -1681,10 +1744,10 @@
           <a:bodyPr/>
           <a:lstStyle/>
           <a:p>
-            <a:fld id="{B3FBD222-EC17-4DD3-B345-80B4482D5E8B}" type="datetime1">
+            <a:fld id="{42861987-37C2-42AD-B493-4494BA5A13E1}" type="datetime1">
               <a:rPr lang="ru-RU" smtClean="0"/>
               <a:pPr/>
-              <a:t>26.01.2015</a:t>
+              <a:t>27.01.2015</a:t>
             </a:fld>
             <a:endParaRPr lang="ru-RU"/>
           </a:p>
@@ -1966,10 +2029,10 @@
           <a:bodyPr/>
           <a:lstStyle/>
           <a:p>
-            <a:fld id="{BA9E0D5B-4F5D-4919-B6F1-65B65B368FE4}" type="datetime1">
+            <a:fld id="{2A4465FD-511F-4260-9204-BACF7F679A9F}" type="datetime1">
               <a:rPr lang="ru-RU" smtClean="0"/>
               <a:pPr/>
-              <a:t>26.01.2015</a:t>
+              <a:t>27.01.2015</a:t>
             </a:fld>
             <a:endParaRPr lang="ru-RU"/>
           </a:p>
@@ -2385,10 +2448,10 @@
           <a:bodyPr/>
           <a:lstStyle/>
           <a:p>
-            <a:fld id="{8497215D-97B2-4FA0-AD6B-B222321EC65D}" type="datetime1">
+            <a:fld id="{B1EC4731-6842-4603-B4B2-A622BDCE14B7}" type="datetime1">
               <a:rPr lang="ru-RU" smtClean="0"/>
               <a:pPr/>
-              <a:t>26.01.2015</a:t>
+              <a:t>27.01.2015</a:t>
             </a:fld>
             <a:endParaRPr lang="ru-RU"/>
           </a:p>
@@ -2500,10 +2563,10 @@
           <a:bodyPr/>
           <a:lstStyle/>
           <a:p>
-            <a:fld id="{9647CEBE-CC77-4BAF-BCC0-9CE38374DF9B}" type="datetime1">
+            <a:fld id="{8466B6E7-96C3-4E76-B58F-5DD2087FBE18}" type="datetime1">
               <a:rPr lang="ru-RU" smtClean="0"/>
               <a:pPr/>
-              <a:t>26.01.2015</a:t>
+              <a:t>27.01.2015</a:t>
             </a:fld>
             <a:endParaRPr lang="ru-RU"/>
           </a:p>
@@ -2592,10 +2655,10 @@
           <a:bodyPr/>
           <a:lstStyle/>
           <a:p>
-            <a:fld id="{B366F13C-564C-4DE3-B57E-BB6014B9EFD8}" type="datetime1">
+            <a:fld id="{25B6CE7B-8EF1-41FE-84F9-DED88460591A}" type="datetime1">
               <a:rPr lang="ru-RU" smtClean="0"/>
               <a:pPr/>
-              <a:t>26.01.2015</a:t>
+              <a:t>27.01.2015</a:t>
             </a:fld>
             <a:endParaRPr lang="ru-RU"/>
           </a:p>
@@ -2866,10 +2929,10 @@
           <a:bodyPr/>
           <a:lstStyle/>
           <a:p>
-            <a:fld id="{9685A6B4-19BB-454C-861C-B80FAB7E52BB}" type="datetime1">
+            <a:fld id="{C081FDF3-3F6A-420D-A1E0-2D4A58D6587F}" type="datetime1">
               <a:rPr lang="ru-RU" smtClean="0"/>
               <a:pPr/>
-              <a:t>26.01.2015</a:t>
+              <a:t>27.01.2015</a:t>
             </a:fld>
             <a:endParaRPr lang="ru-RU"/>
           </a:p>
@@ -3116,10 +3179,10 @@
           <a:bodyPr/>
           <a:lstStyle/>
           <a:p>
-            <a:fld id="{836128BF-3D85-49AD-B5D6-B381D0813BFA}" type="datetime1">
+            <a:fld id="{25F77A77-28B7-4402-B85A-98C7E0356940}" type="datetime1">
               <a:rPr lang="ru-RU" smtClean="0"/>
               <a:pPr/>
-              <a:t>26.01.2015</a:t>
+              <a:t>27.01.2015</a:t>
             </a:fld>
             <a:endParaRPr lang="ru-RU"/>
           </a:p>
@@ -3335,10 +3398,10 @@
             </a:lvl1pPr>
           </a:lstStyle>
           <a:p>
-            <a:fld id="{967CA87E-40A3-440A-AF68-E3353CE08334}" type="datetime1">
+            <a:fld id="{B4041D33-5472-4F15-A32A-B43516D50C2E}" type="datetime1">
               <a:rPr lang="ru-RU" smtClean="0"/>
               <a:pPr/>
-              <a:t>26.01.2015</a:t>
+              <a:t>27.01.2015</a:t>
             </a:fld>
             <a:endParaRPr lang="ru-RU"/>
           </a:p>
@@ -3439,7 +3502,7 @@
     <p:sldLayoutId id="2147483658" r:id="rId10"/>
     <p:sldLayoutId id="2147483659" r:id="rId11"/>
   </p:sldLayoutIdLst>
-  <p:hf hdr="0" dt="0"/>
+  <p:hf hdr="0" ftr="0" dt="0"/>
   <p:txStyles>
     <p:titleStyle>
       <a:lvl1pPr algn="ctr" defTabSz="914400" rtl="0" eaLnBrk="1" latinLnBrk="0" hangingPunct="1">
@@ -4331,7 +4394,7 @@
                 <a:ea typeface="+mj-ea"/>
                 <a:cs typeface="+mj-cs"/>
               </a:rPr>
-              <a:t>Issues Page</a:t>
+              <a:t>Issue Report</a:t>
             </a:r>
             <a:endParaRPr kumimoji="0" lang="ru-RU" sz="4400" b="0" i="0" u="none" strike="noStrike" kern="1200" cap="none" spc="0" normalizeH="0" baseline="0" noProof="0" dirty="0">
               <a:ln>
@@ -4640,7 +4703,7 @@
                 </a:solidFill>
                 <a:latin typeface="Verdana" pitchFamily="34" charset="0"/>
               </a:rPr>
-              <a:t>Worklogs Report</a:t>
+              <a:t>Worklog Report</a:t>
             </a:r>
             <a:endParaRPr lang="ru-RU" dirty="0"/>
           </a:p>
@@ -4744,13 +4807,11 @@
       </p:sp>
       <p:pic>
         <p:nvPicPr>
-          <p:cNvPr id="4098" name="Picture 2" descr="C:\repo\project-jastt\presentation\source\worklog_pdf.png"/>
+          <p:cNvPr id="1027" name="Picture 3" descr="C:\repo\project-jastt\presentation\source\worklog_pdf.png"/>
           <p:cNvPicPr>
-            <a:picLocks noGrp="1" noChangeAspect="1" noChangeArrowheads="1"/>
+            <a:picLocks noChangeAspect="1" noChangeArrowheads="1"/>
           </p:cNvPicPr>
-          <p:nvPr>
-            <p:ph idx="1"/>
-          </p:nvPr>
+          <p:nvPr/>
         </p:nvPicPr>
         <p:blipFill>
           <a:blip r:embed="rId2"/>
@@ -4761,8 +4822,8 @@
         </p:blipFill>
         <p:spPr bwMode="auto">
           <a:xfrm>
-            <a:off x="1000100" y="1214422"/>
-            <a:ext cx="7524000" cy="4525963"/>
+            <a:off x="785786" y="1000108"/>
+            <a:ext cx="7273023" cy="5148000"/>
           </a:xfrm>
           <a:prstGeom prst="rect">
             <a:avLst/>
@@ -4924,19 +4985,19 @@
         </p:nvSpPr>
         <p:spPr>
           <a:xfrm>
-            <a:off x="642910" y="928670"/>
+            <a:off x="642910" y="857232"/>
             <a:ext cx="7772400" cy="928694"/>
           </a:xfrm>
           <a:noFill/>
         </p:spPr>
         <p:txBody>
           <a:bodyPr>
-            <a:normAutofit/>
+            <a:normAutofit fontScale="90000"/>
           </a:bodyPr>
           <a:lstStyle/>
           <a:p>
             <a:r>
-              <a:rPr lang="ru-RU" sz="3600" dirty="0" smtClean="0">
+              <a:rPr lang="en-US" sz="3600" dirty="0" smtClean="0">
                 <a:solidFill>
                   <a:schemeClr val="tx2">
                     <a:lumMod val="75000"/>
@@ -4944,7 +5005,7 @@
                 </a:solidFill>
                 <a:latin typeface="Verdana" pitchFamily="34" charset="0"/>
               </a:rPr>
-              <a:t>Используемые технологии</a:t>
+              <a:t>Developer Tools and Frameworks</a:t>
             </a:r>
             <a:endParaRPr lang="ru-RU" sz="3600" dirty="0">
               <a:solidFill>
@@ -5658,7 +5719,7 @@
           <a:lstStyle/>
           <a:p>
             <a:r>
-              <a:rPr lang="ru-RU" dirty="0" smtClean="0">
+              <a:rPr lang="en-US" dirty="0" smtClean="0">
                 <a:solidFill>
                   <a:schemeClr val="tx2">
                     <a:lumMod val="75000"/>
@@ -5666,7 +5727,7 @@
                 </a:solidFill>
                 <a:latin typeface="Verdana" pitchFamily="34" charset="0"/>
               </a:rPr>
-              <a:t>Цели проекта</a:t>
+              <a:t>Project Scope</a:t>
             </a:r>
             <a:endParaRPr lang="ru-RU" dirty="0">
               <a:solidFill>
@@ -6064,7 +6125,7 @@
           <p:nvPr/>
         </p:nvPicPr>
         <p:blipFill>
-          <a:blip r:embed="rId2"/>
+          <a:blip r:embed="rId3"/>
           <a:srcRect/>
           <a:stretch>
             <a:fillRect/>
@@ -6072,7 +6133,7 @@
         </p:blipFill>
         <p:spPr bwMode="auto">
           <a:xfrm>
-            <a:off x="142844" y="1177892"/>
+            <a:off x="226156" y="1500174"/>
             <a:ext cx="8775000" cy="4680000"/>
           </a:xfrm>
           <a:prstGeom prst="rect">
@@ -6081,6 +6142,85 @@
           <a:noFill/>
         </p:spPr>
       </p:pic>
+      <p:sp>
+        <p:nvSpPr>
+          <p:cNvPr id="4" name="Заголовок 3"/>
+          <p:cNvSpPr txBox="1">
+            <a:spLocks/>
+          </p:cNvSpPr>
+          <p:nvPr/>
+        </p:nvSpPr>
+        <p:spPr>
+          <a:xfrm>
+            <a:off x="642910" y="642918"/>
+            <a:ext cx="7772400" cy="928694"/>
+          </a:xfrm>
+          <a:prstGeom prst="rect">
+            <a:avLst/>
+          </a:prstGeom>
+          <a:noFill/>
+        </p:spPr>
+        <p:txBody>
+          <a:bodyPr vert="horz" lIns="91440" tIns="45720" rIns="91440" bIns="45720" rtlCol="0" anchor="ctr">
+            <a:normAutofit/>
+          </a:bodyPr>
+          <a:lstStyle/>
+          <a:p>
+            <a:pPr marL="0" marR="0" lvl="0" indent="0" algn="ctr" defTabSz="914400" rtl="0" eaLnBrk="1" fontAlgn="auto" latinLnBrk="0" hangingPunct="1">
+              <a:lnSpc>
+                <a:spcPct val="100000"/>
+              </a:lnSpc>
+              <a:spcBef>
+                <a:spcPct val="0"/>
+              </a:spcBef>
+              <a:spcAft>
+                <a:spcPts val="0"/>
+              </a:spcAft>
+              <a:buClrTx/>
+              <a:buSzTx/>
+              <a:buFontTx/>
+              <a:buNone/>
+              <a:tabLst/>
+              <a:defRPr/>
+            </a:pPr>
+            <a:r>
+              <a:rPr kumimoji="0" lang="en-US" sz="4400" b="0" i="0" u="none" strike="noStrike" kern="1200" cap="none" spc="0" normalizeH="0" baseline="0" noProof="0" dirty="0" smtClean="0">
+                <a:ln>
+                  <a:noFill/>
+                </a:ln>
+                <a:solidFill>
+                  <a:schemeClr val="tx2">
+                    <a:lumMod val="75000"/>
+                  </a:schemeClr>
+                </a:solidFill>
+                <a:effectLst/>
+                <a:uLnTx/>
+                <a:uFillTx/>
+                <a:latin typeface="Verdana" pitchFamily="34" charset="0"/>
+                <a:ea typeface="+mj-ea"/>
+                <a:cs typeface="+mj-cs"/>
+              </a:rPr>
+              <a:t>Activity</a:t>
+            </a:r>
+            <a:endParaRPr kumimoji="0" lang="ru-RU" sz="4400" b="0" i="0" u="none" strike="noStrike" kern="1200" cap="none" spc="0" normalizeH="0" baseline="0" noProof="0" dirty="0">
+              <a:ln>
+                <a:noFill/>
+              </a:ln>
+              <a:solidFill>
+                <a:schemeClr val="tx2">
+                  <a:lumMod val="75000"/>
+                </a:schemeClr>
+              </a:solidFill>
+              <a:effectLst/>
+              <a:uLnTx/>
+              <a:uFillTx/>
+              <a:latin typeface="Verdana" pitchFamily="34" charset="0"/>
+              <a:ea typeface="+mj-ea"/>
+              <a:cs typeface="+mj-cs"/>
+            </a:endParaRPr>
+          </a:p>
+        </p:txBody>
+      </p:sp>
     </p:spTree>
   </p:cSld>
   <p:clrMapOvr>
@@ -6205,7 +6345,7 @@
           <a:lstStyle/>
           <a:p>
             <a:r>
-              <a:rPr lang="ru-RU" dirty="0" smtClean="0">
+              <a:rPr lang="en-US" dirty="0" smtClean="0">
                 <a:solidFill>
                   <a:schemeClr val="tx2">
                     <a:lumMod val="75000"/>
@@ -6213,7 +6353,7 @@
                 </a:solidFill>
                 <a:latin typeface="Verdana" pitchFamily="34" charset="0"/>
               </a:rPr>
-              <a:t>Архитектура проекта</a:t>
+              <a:t>Design and Architecture</a:t>
             </a:r>
             <a:endParaRPr lang="ru-RU" dirty="0">
               <a:solidFill>
@@ -6261,7 +6401,7 @@
                 </a:solidFill>
                 <a:latin typeface="Verdana" pitchFamily="34" charset="0"/>
               </a:rPr>
-              <a:t>Domain Model</a:t>
+              <a:t>Data Storage and Source Layer</a:t>
             </a:r>
             <a:endParaRPr lang="ru-RU" sz="2400" dirty="0" smtClean="0">
               <a:solidFill>
@@ -6286,7 +6426,7 @@
                 </a:solidFill>
                 <a:latin typeface="Verdana" pitchFamily="34" charset="0"/>
               </a:rPr>
-              <a:t>Business Entities (POJO classes)</a:t>
+              <a:t>Data Management Layer</a:t>
             </a:r>
             <a:r>
               <a:rPr lang="ru-RU" sz="2400" dirty="0" smtClean="0">
@@ -6314,7 +6454,24 @@
                 </a:solidFill>
                 <a:latin typeface="Verdana" pitchFamily="34" charset="0"/>
               </a:rPr>
-              <a:t>Data Access Layer Providers</a:t>
+              <a:t>Business Layer.</a:t>
+            </a:r>
+          </a:p>
+          <a:p>
+            <a:pPr marL="457200" indent="-457200" algn="just" fontAlgn="base">
+              <a:buFont typeface="+mj-lt"/>
+              <a:buAutoNum type="arabicPeriod"/>
+            </a:pPr>
+            <a:r>
+              <a:rPr lang="en-US" sz="2400" dirty="0" smtClean="0">
+                <a:solidFill>
+                  <a:schemeClr val="tx2">
+                    <a:lumMod val="75000"/>
+                  </a:schemeClr>
+                </a:solidFill>
+                <a:latin typeface="Verdana" pitchFamily="34" charset="0"/>
+              </a:rPr>
+              <a:t>JIRA Services</a:t>
             </a:r>
             <a:r>
               <a:rPr lang="ru-RU" sz="2400" dirty="0" smtClean="0">
@@ -6327,6 +6484,14 @@
               </a:rPr>
               <a:t>.</a:t>
             </a:r>
+            <a:endParaRPr lang="en-US" sz="2400" dirty="0" smtClean="0">
+              <a:solidFill>
+                <a:schemeClr val="tx2">
+                  <a:lumMod val="75000"/>
+                </a:schemeClr>
+              </a:solidFill>
+              <a:latin typeface="Verdana" pitchFamily="34" charset="0"/>
+            </a:endParaRPr>
           </a:p>
           <a:p>
             <a:pPr marL="457200" indent="-457200" algn="just" fontAlgn="base">
@@ -6342,60 +6507,7 @@
                 </a:solidFill>
                 <a:latin typeface="Verdana" pitchFamily="34" charset="0"/>
               </a:rPr>
-              <a:t>JIRA Services</a:t>
-            </a:r>
-            <a:r>
-              <a:rPr lang="ru-RU" sz="2400" dirty="0" smtClean="0">
-                <a:solidFill>
-                  <a:schemeClr val="tx2">
-                    <a:lumMod val="75000"/>
-                  </a:schemeClr>
-                </a:solidFill>
-                <a:latin typeface="Verdana" pitchFamily="34" charset="0"/>
-              </a:rPr>
-              <a:t>.</a:t>
-            </a:r>
-            <a:endParaRPr lang="en-US" sz="2400" dirty="0" smtClean="0">
-              <a:solidFill>
-                <a:schemeClr val="tx2">
-                  <a:lumMod val="75000"/>
-                </a:schemeClr>
-              </a:solidFill>
-              <a:latin typeface="Verdana" pitchFamily="34" charset="0"/>
-            </a:endParaRPr>
-          </a:p>
-          <a:p>
-            <a:pPr marL="457200" indent="-457200" algn="just" fontAlgn="base">
-              <a:buFont typeface="+mj-lt"/>
-              <a:buAutoNum type="arabicPeriod"/>
-            </a:pPr>
-            <a:r>
-              <a:rPr lang="en-US" sz="2400" dirty="0" smtClean="0">
-                <a:solidFill>
-                  <a:schemeClr val="tx2">
-                    <a:lumMod val="75000"/>
-                  </a:schemeClr>
-                </a:solidFill>
-                <a:latin typeface="Verdana" pitchFamily="34" charset="0"/>
-              </a:rPr>
-              <a:t>Business Services.</a:t>
-            </a:r>
-          </a:p>
-          <a:p>
-            <a:pPr marL="457200" indent="-457200" algn="just" fontAlgn="base">
-              <a:buFont typeface="+mj-lt"/>
-              <a:buAutoNum type="arabicPeriod"/>
-            </a:pPr>
-            <a:r>
-              <a:rPr lang="en-US" sz="2400" dirty="0" smtClean="0">
-                <a:solidFill>
-                  <a:schemeClr val="tx2">
-                    <a:lumMod val="75000"/>
-                  </a:schemeClr>
-                </a:solidFill>
-                <a:latin typeface="Verdana" pitchFamily="34" charset="0"/>
-              </a:rPr>
-              <a:t>Web-application.</a:t>
+              <a:t>Presentation Layer.</a:t>
             </a:r>
           </a:p>
           <a:p>
@@ -6964,25 +7076,6 @@
               <a:t>DAL Providers</a:t>
             </a:r>
             <a:endParaRPr lang="ru-RU" dirty="0"/>
-          </a:p>
-        </p:txBody>
-      </p:sp>
-      <p:sp>
-        <p:nvSpPr>
-          <p:cNvPr id="4" name="Нижний колонтитул 3"/>
-          <p:cNvSpPr>
-            <a:spLocks noGrp="1"/>
-          </p:cNvSpPr>
-          <p:nvPr>
-            <p:ph type="ftr" sz="quarter" idx="11"/>
-          </p:nvPr>
-        </p:nvSpPr>
-        <p:spPr/>
-        <p:txBody>
-          <a:bodyPr/>
-          <a:lstStyle/>
-          <a:p>
-            <a:endParaRPr lang="ru-RU"/>
           </a:p>
         </p:txBody>
       </p:sp>

</xml_diff>